<commit_message>
tableau dashboard descriptions in its own powerpoint
</commit_message>
<xml_diff>
--- a/Group_1_Presentation.pptx
+++ b/Group_1_Presentation.pptx
@@ -1,22 +1,22 @@
 
 <file path=ppt/presentation.xml><?xml version="1.0" encoding="utf-8"?>
-<p:presentation xmlns:a="http://schemas.openxmlformats.org/drawingml/2006/main" xmlns:r="http://schemas.openxmlformats.org/officeDocument/2006/relationships" xmlns:mc="http://schemas.openxmlformats.org/markup-compatibility/2006" xmlns:mv="urn:schemas-microsoft-com:mac:vml" xmlns:p="http://schemas.openxmlformats.org/presentationml/2006/main" xmlns:c="http://schemas.openxmlformats.org/drawingml/2006/chart" xmlns:dgm="http://schemas.openxmlformats.org/drawingml/2006/diagram" xmlns:o="urn:schemas-microsoft-com:office:office" xmlns:v="urn:schemas-microsoft-com:vml" xmlns:pvml="urn:schemas-microsoft-com:office:powerpoint" xmlns:com="http://schemas.openxmlformats.org/drawingml/2006/compatibility" xmlns:p14="http://schemas.microsoft.com/office/powerpoint/2010/main" xmlns:p15="http://schemas.microsoft.com/office/powerpoint/2012/main" xmlns:ahyp="http://schemas.microsoft.com/office/drawing/2018/hyperlinkcolor" autoCompressPictures="0" strictFirstAndLastChars="0" saveSubsetFonts="1">
+<p:presentation xmlns:a="http://schemas.openxmlformats.org/drawingml/2006/main" xmlns:r="http://schemas.openxmlformats.org/officeDocument/2006/relationships" xmlns:p="http://schemas.openxmlformats.org/presentationml/2006/main" strictFirstAndLastChars="0" saveSubsetFonts="1" autoCompressPictures="0">
   <p:sldMasterIdLst>
-    <p:sldMasterId id="2147483659" r:id="rId4"/>
+    <p:sldMasterId id="2147483659" r:id="rId1"/>
   </p:sldMasterIdLst>
   <p:notesMasterIdLst>
-    <p:notesMasterId r:id="rId5"/>
+    <p:notesMasterId r:id="rId6"/>
   </p:notesMasterIdLst>
   <p:sldIdLst>
-    <p:sldId id="256" r:id="rId6"/>
-    <p:sldId id="257" r:id="rId7"/>
-    <p:sldId id="258" r:id="rId8"/>
-    <p:sldId id="259" r:id="rId9"/>
+    <p:sldId id="256" r:id="rId2"/>
+    <p:sldId id="257" r:id="rId3"/>
+    <p:sldId id="258" r:id="rId4"/>
+    <p:sldId id="259" r:id="rId5"/>
   </p:sldIdLst>
-  <p:sldSz cy="5143500" cx="9144000"/>
+  <p:sldSz cx="9144000" cy="5143500" type="screen16x9"/>
   <p:notesSz cx="6858000" cy="9144000"/>
   <p:defaultTextStyle>
-    <a:defPPr lvl="0" marR="0" rtl="0" algn="l">
+    <a:defPPr marR="0" lvl="0" algn="l" rtl="0">
       <a:lnSpc>
         <a:spcPct val="100000"/>
       </a:lnSpc>
@@ -27,7 +27,7 @@
         <a:spcPts val="0"/>
       </a:spcAft>
     </a:defPPr>
-    <a:lvl1pPr lvl="0" marR="0" rtl="0" algn="l">
+    <a:lvl1pPr marR="0" lvl="0" algn="l" rtl="0">
       <a:lnSpc>
         <a:spcPct val="100000"/>
       </a:lnSpc>
@@ -41,7 +41,7 @@
         <a:srgbClr val="000000"/>
       </a:buClr>
       <a:buFont typeface="Arial"/>
-      <a:defRPr b="0" i="0" sz="1400" u="none" cap="none" strike="noStrike">
+      <a:defRPr sz="1400" b="0" i="0" u="none" strike="noStrike" cap="none">
         <a:solidFill>
           <a:srgbClr val="000000"/>
         </a:solidFill>
@@ -51,7 +51,7 @@
         <a:sym typeface="Arial"/>
       </a:defRPr>
     </a:lvl1pPr>
-    <a:lvl2pPr lvl="1" marR="0" rtl="0" algn="l">
+    <a:lvl2pPr marR="0" lvl="1" algn="l" rtl="0">
       <a:lnSpc>
         <a:spcPct val="100000"/>
       </a:lnSpc>
@@ -65,7 +65,7 @@
         <a:srgbClr val="000000"/>
       </a:buClr>
       <a:buFont typeface="Arial"/>
-      <a:defRPr b="0" i="0" sz="1400" u="none" cap="none" strike="noStrike">
+      <a:defRPr sz="1400" b="0" i="0" u="none" strike="noStrike" cap="none">
         <a:solidFill>
           <a:srgbClr val="000000"/>
         </a:solidFill>
@@ -75,7 +75,7 @@
         <a:sym typeface="Arial"/>
       </a:defRPr>
     </a:lvl2pPr>
-    <a:lvl3pPr lvl="2" marR="0" rtl="0" algn="l">
+    <a:lvl3pPr marR="0" lvl="2" algn="l" rtl="0">
       <a:lnSpc>
         <a:spcPct val="100000"/>
       </a:lnSpc>
@@ -89,7 +89,7 @@
         <a:srgbClr val="000000"/>
       </a:buClr>
       <a:buFont typeface="Arial"/>
-      <a:defRPr b="0" i="0" sz="1400" u="none" cap="none" strike="noStrike">
+      <a:defRPr sz="1400" b="0" i="0" u="none" strike="noStrike" cap="none">
         <a:solidFill>
           <a:srgbClr val="000000"/>
         </a:solidFill>
@@ -99,7 +99,7 @@
         <a:sym typeface="Arial"/>
       </a:defRPr>
     </a:lvl3pPr>
-    <a:lvl4pPr lvl="3" marR="0" rtl="0" algn="l">
+    <a:lvl4pPr marR="0" lvl="3" algn="l" rtl="0">
       <a:lnSpc>
         <a:spcPct val="100000"/>
       </a:lnSpc>
@@ -113,7 +113,7 @@
         <a:srgbClr val="000000"/>
       </a:buClr>
       <a:buFont typeface="Arial"/>
-      <a:defRPr b="0" i="0" sz="1400" u="none" cap="none" strike="noStrike">
+      <a:defRPr sz="1400" b="0" i="0" u="none" strike="noStrike" cap="none">
         <a:solidFill>
           <a:srgbClr val="000000"/>
         </a:solidFill>
@@ -123,7 +123,7 @@
         <a:sym typeface="Arial"/>
       </a:defRPr>
     </a:lvl4pPr>
-    <a:lvl5pPr lvl="4" marR="0" rtl="0" algn="l">
+    <a:lvl5pPr marR="0" lvl="4" algn="l" rtl="0">
       <a:lnSpc>
         <a:spcPct val="100000"/>
       </a:lnSpc>
@@ -137,7 +137,7 @@
         <a:srgbClr val="000000"/>
       </a:buClr>
       <a:buFont typeface="Arial"/>
-      <a:defRPr b="0" i="0" sz="1400" u="none" cap="none" strike="noStrike">
+      <a:defRPr sz="1400" b="0" i="0" u="none" strike="noStrike" cap="none">
         <a:solidFill>
           <a:srgbClr val="000000"/>
         </a:solidFill>
@@ -147,7 +147,7 @@
         <a:sym typeface="Arial"/>
       </a:defRPr>
     </a:lvl5pPr>
-    <a:lvl6pPr lvl="5" marR="0" rtl="0" algn="l">
+    <a:lvl6pPr marR="0" lvl="5" algn="l" rtl="0">
       <a:lnSpc>
         <a:spcPct val="100000"/>
       </a:lnSpc>
@@ -161,7 +161,7 @@
         <a:srgbClr val="000000"/>
       </a:buClr>
       <a:buFont typeface="Arial"/>
-      <a:defRPr b="0" i="0" sz="1400" u="none" cap="none" strike="noStrike">
+      <a:defRPr sz="1400" b="0" i="0" u="none" strike="noStrike" cap="none">
         <a:solidFill>
           <a:srgbClr val="000000"/>
         </a:solidFill>
@@ -171,7 +171,7 @@
         <a:sym typeface="Arial"/>
       </a:defRPr>
     </a:lvl6pPr>
-    <a:lvl7pPr lvl="6" marR="0" rtl="0" algn="l">
+    <a:lvl7pPr marR="0" lvl="6" algn="l" rtl="0">
       <a:lnSpc>
         <a:spcPct val="100000"/>
       </a:lnSpc>
@@ -185,7 +185,7 @@
         <a:srgbClr val="000000"/>
       </a:buClr>
       <a:buFont typeface="Arial"/>
-      <a:defRPr b="0" i="0" sz="1400" u="none" cap="none" strike="noStrike">
+      <a:defRPr sz="1400" b="0" i="0" u="none" strike="noStrike" cap="none">
         <a:solidFill>
           <a:srgbClr val="000000"/>
         </a:solidFill>
@@ -195,7 +195,7 @@
         <a:sym typeface="Arial"/>
       </a:defRPr>
     </a:lvl7pPr>
-    <a:lvl8pPr lvl="7" marR="0" rtl="0" algn="l">
+    <a:lvl8pPr marR="0" lvl="7" algn="l" rtl="0">
       <a:lnSpc>
         <a:spcPct val="100000"/>
       </a:lnSpc>
@@ -209,7 +209,7 @@
         <a:srgbClr val="000000"/>
       </a:buClr>
       <a:buFont typeface="Arial"/>
-      <a:defRPr b="0" i="0" sz="1400" u="none" cap="none" strike="noStrike">
+      <a:defRPr sz="1400" b="0" i="0" u="none" strike="noStrike" cap="none">
         <a:solidFill>
           <a:srgbClr val="000000"/>
         </a:solidFill>
@@ -219,7 +219,7 @@
         <a:sym typeface="Arial"/>
       </a:defRPr>
     </a:lvl8pPr>
-    <a:lvl9pPr lvl="8" marR="0" rtl="0" algn="l">
+    <a:lvl9pPr marR="0" lvl="8" algn="l" rtl="0">
       <a:lnSpc>
         <a:spcPct val="100000"/>
       </a:lnSpc>
@@ -233,7 +233,7 @@
         <a:srgbClr val="000000"/>
       </a:buClr>
       <a:buFont typeface="Arial"/>
-      <a:defRPr b="0" i="0" sz="1400" u="none" cap="none" strike="noStrike">
+      <a:defRPr sz="1400" b="0" i="0" u="none" strike="noStrike" cap="none">
         <a:solidFill>
           <a:srgbClr val="000000"/>
         </a:solidFill>
@@ -246,7 +246,7 @@
   </p:defaultTextStyle>
   <p:extLst>
     <p:ext uri="{EFAFB233-063F-42B5-8137-9DF3F51BA10A}">
-      <p15:sldGuideLst>
+      <p15:sldGuideLst xmlns:p15="http://schemas.microsoft.com/office/powerpoint/2012/main">
         <p15:guide id="1" orient="horz" pos="1620">
           <p15:clr>
             <a:srgbClr val="A4A3A4"/>
@@ -264,11 +264,16 @@
 </file>
 
 <file path=ppt/notesMasters/notesMaster1.xml><?xml version="1.0" encoding="utf-8"?>
-<p:notesMaster xmlns:a="http://schemas.openxmlformats.org/drawingml/2006/main" xmlns:r="http://schemas.openxmlformats.org/officeDocument/2006/relationships" xmlns:mc="http://schemas.openxmlformats.org/markup-compatibility/2006" xmlns:mv="urn:schemas-microsoft-com:mac:vml" xmlns:p="http://schemas.openxmlformats.org/presentationml/2006/main" xmlns:c="http://schemas.openxmlformats.org/drawingml/2006/chart" xmlns:dgm="http://schemas.openxmlformats.org/drawingml/2006/diagram" xmlns:o="urn:schemas-microsoft-com:office:office" xmlns:v="urn:schemas-microsoft-com:vml" xmlns:pvml="urn:schemas-microsoft-com:office:powerpoint" xmlns:com="http://schemas.openxmlformats.org/drawingml/2006/compatibility" xmlns:p14="http://schemas.microsoft.com/office/powerpoint/2010/main" xmlns:p15="http://schemas.microsoft.com/office/powerpoint/2012/main" xmlns:ahyp="http://schemas.microsoft.com/office/drawing/2018/hyperlinkcolor">
+<p:notesMaster xmlns:a="http://schemas.openxmlformats.org/drawingml/2006/main" xmlns:r="http://schemas.openxmlformats.org/officeDocument/2006/relationships" xmlns:p="http://schemas.openxmlformats.org/presentationml/2006/main">
   <p:cSld>
+    <p:bg>
+      <p:bgRef idx="1001">
+        <a:schemeClr val="bg1"/>
+      </p:bgRef>
+    </p:bg>
     <p:spTree>
       <p:nvGrpSpPr>
-        <p:cNvPr id="2" name="Shape 2"/>
+        <p:cNvPr id="1" name="Shape 2"/>
         <p:cNvGrpSpPr/>
         <p:nvPr/>
       </p:nvGrpSpPr>
@@ -283,9 +288,11 @@
       <p:sp>
         <p:nvSpPr>
           <p:cNvPr id="3" name="Google Shape;3;n"/>
-          <p:cNvSpPr/>
+          <p:cNvSpPr>
+            <a:spLocks noGrp="1" noRot="1" noChangeAspect="1"/>
+          </p:cNvSpPr>
           <p:nvPr>
-            <p:ph idx="2" type="sldImg"/>
+            <p:ph type="sldImg" idx="2"/>
           </p:nvPr>
         </p:nvSpPr>
         <p:spPr>
@@ -294,9 +301,13 @@
             <a:ext cx="6096075" cy="3429000"/>
           </a:xfrm>
           <a:custGeom>
-            <a:rect b="b" l="l" r="r" t="t"/>
+            <a:avLst/>
+            <a:gdLst/>
+            <a:ahLst/>
+            <a:cxnLst/>
+            <a:rect l="l" t="t" r="r" b="b"/>
             <a:pathLst>
-              <a:path extrusionOk="0" h="120000" w="120000">
+              <a:path w="120000" h="120000" extrusionOk="0">
                 <a:moveTo>
                   <a:pt x="0" y="0"/>
                 </a:moveTo>
@@ -314,23 +325,25 @@
             </a:pathLst>
           </a:custGeom>
           <a:noFill/>
-          <a:ln cap="flat" cmpd="sng" w="9525">
+          <a:ln w="9525" cap="flat" cmpd="sng">
             <a:solidFill>
               <a:srgbClr val="000000"/>
             </a:solidFill>
             <a:prstDash val="solid"/>
             <a:round/>
-            <a:headEnd len="sm" w="sm" type="none"/>
-            <a:tailEnd len="sm" w="sm" type="none"/>
+            <a:headEnd type="none" w="sm" len="sm"/>
+            <a:tailEnd type="none" w="sm" len="sm"/>
           </a:ln>
         </p:spPr>
       </p:sp>
       <p:sp>
         <p:nvSpPr>
           <p:cNvPr id="4" name="Google Shape;4;n"/>
-          <p:cNvSpPr txBox="1"/>
+          <p:cNvSpPr txBox="1">
+            <a:spLocks noGrp="1"/>
+          </p:cNvSpPr>
           <p:nvPr>
-            <p:ph idx="1" type="body"/>
+            <p:ph type="body" idx="1"/>
           </p:nvPr>
         </p:nvSpPr>
         <p:spPr>
@@ -347,11 +360,11 @@
           </a:ln>
         </p:spPr>
         <p:txBody>
-          <a:bodyPr anchorCtr="0" anchor="t" bIns="91425" lIns="91425" spcFirstLastPara="1" rIns="91425" wrap="square" tIns="91425">
+          <a:bodyPr spcFirstLastPara="1" wrap="square" lIns="91425" tIns="91425" rIns="91425" bIns="91425" anchor="t" anchorCtr="0">
             <a:noAutofit/>
           </a:bodyPr>
           <a:lstStyle>
-            <a:lvl1pPr indent="-298450" lvl="0" marL="457200">
+            <a:lvl1pPr marL="457200" lvl="0" indent="-298450">
               <a:spcBef>
                 <a:spcPts val="0"/>
               </a:spcBef>
@@ -362,7 +375,7 @@
               <a:buChar char="●"/>
               <a:defRPr sz="1100"/>
             </a:lvl1pPr>
-            <a:lvl2pPr indent="-298450" lvl="1" marL="914400">
+            <a:lvl2pPr marL="914400" lvl="1" indent="-298450">
               <a:spcBef>
                 <a:spcPts val="0"/>
               </a:spcBef>
@@ -373,7 +386,7 @@
               <a:buChar char="○"/>
               <a:defRPr sz="1100"/>
             </a:lvl2pPr>
-            <a:lvl3pPr indent="-298450" lvl="2" marL="1371600">
+            <a:lvl3pPr marL="1371600" lvl="2" indent="-298450">
               <a:spcBef>
                 <a:spcPts val="0"/>
               </a:spcBef>
@@ -384,7 +397,7 @@
               <a:buChar char="■"/>
               <a:defRPr sz="1100"/>
             </a:lvl3pPr>
-            <a:lvl4pPr indent="-298450" lvl="3" marL="1828800">
+            <a:lvl4pPr marL="1828800" lvl="3" indent="-298450">
               <a:spcBef>
                 <a:spcPts val="0"/>
               </a:spcBef>
@@ -395,7 +408,7 @@
               <a:buChar char="●"/>
               <a:defRPr sz="1100"/>
             </a:lvl4pPr>
-            <a:lvl5pPr indent="-298450" lvl="4" marL="2286000">
+            <a:lvl5pPr marL="2286000" lvl="4" indent="-298450">
               <a:spcBef>
                 <a:spcPts val="0"/>
               </a:spcBef>
@@ -406,7 +419,7 @@
               <a:buChar char="○"/>
               <a:defRPr sz="1100"/>
             </a:lvl5pPr>
-            <a:lvl6pPr indent="-298450" lvl="5" marL="2743200">
+            <a:lvl6pPr marL="2743200" lvl="5" indent="-298450">
               <a:spcBef>
                 <a:spcPts val="0"/>
               </a:spcBef>
@@ -417,7 +430,7 @@
               <a:buChar char="■"/>
               <a:defRPr sz="1100"/>
             </a:lvl6pPr>
-            <a:lvl7pPr indent="-298450" lvl="6" marL="3200400">
+            <a:lvl7pPr marL="3200400" lvl="6" indent="-298450">
               <a:spcBef>
                 <a:spcPts val="0"/>
               </a:spcBef>
@@ -428,7 +441,7 @@
               <a:buChar char="●"/>
               <a:defRPr sz="1100"/>
             </a:lvl7pPr>
-            <a:lvl8pPr indent="-298450" lvl="7" marL="3657600">
+            <a:lvl8pPr marL="3657600" lvl="7" indent="-298450">
               <a:spcBef>
                 <a:spcPts val="0"/>
               </a:spcBef>
@@ -439,7 +452,7 @@
               <a:buChar char="○"/>
               <a:defRPr sz="1100"/>
             </a:lvl8pPr>
-            <a:lvl9pPr indent="-298450" lvl="8" marL="4114800">
+            <a:lvl9pPr marL="4114800" lvl="8" indent="-298450">
               <a:spcBef>
                 <a:spcPts val="0"/>
               </a:spcBef>
@@ -451,14 +464,16 @@
               <a:defRPr sz="1100"/>
             </a:lvl9pPr>
           </a:lstStyle>
-          <a:p/>
+          <a:p>
+            <a:endParaRPr/>
+          </a:p>
         </p:txBody>
       </p:sp>
     </p:spTree>
   </p:cSld>
-  <p:clrMap accent1="accent1" accent2="accent2" accent3="accent3" accent4="accent4" accent5="accent5" accent6="accent6" bg1="lt1" bg2="dk2" tx1="dk1" tx2="lt2" folHlink="folHlink" hlink="hlink"/>
+  <p:clrMap bg1="lt1" tx1="dk1" bg2="dk2" tx2="lt2" accent1="accent1" accent2="accent2" accent3="accent3" accent4="accent4" accent5="accent5" accent6="accent6" hlink="hlink" folHlink="folHlink"/>
   <p:notesStyle>
-    <a:defPPr lvl="0" marR="0" rtl="0" algn="l">
+    <a:defPPr marR="0" lvl="0" algn="l" rtl="0">
       <a:lnSpc>
         <a:spcPct val="100000"/>
       </a:lnSpc>
@@ -469,7 +484,7 @@
         <a:spcPts val="0"/>
       </a:spcAft>
     </a:defPPr>
-    <a:lvl1pPr lvl="0" marR="0" rtl="0" algn="l">
+    <a:lvl1pPr marR="0" lvl="0" algn="l" rtl="0">
       <a:lnSpc>
         <a:spcPct val="100000"/>
       </a:lnSpc>
@@ -483,7 +498,7 @@
         <a:srgbClr val="000000"/>
       </a:buClr>
       <a:buFont typeface="Arial"/>
-      <a:defRPr b="0" i="0" sz="1400" u="none" cap="none" strike="noStrike">
+      <a:defRPr sz="1400" b="0" i="0" u="none" strike="noStrike" cap="none">
         <a:solidFill>
           <a:srgbClr val="000000"/>
         </a:solidFill>
@@ -493,7 +508,7 @@
         <a:sym typeface="Arial"/>
       </a:defRPr>
     </a:lvl1pPr>
-    <a:lvl2pPr lvl="1" marR="0" rtl="0" algn="l">
+    <a:lvl2pPr marR="0" lvl="1" algn="l" rtl="0">
       <a:lnSpc>
         <a:spcPct val="100000"/>
       </a:lnSpc>
@@ -507,7 +522,7 @@
         <a:srgbClr val="000000"/>
       </a:buClr>
       <a:buFont typeface="Arial"/>
-      <a:defRPr b="0" i="0" sz="1400" u="none" cap="none" strike="noStrike">
+      <a:defRPr sz="1400" b="0" i="0" u="none" strike="noStrike" cap="none">
         <a:solidFill>
           <a:srgbClr val="000000"/>
         </a:solidFill>
@@ -517,7 +532,7 @@
         <a:sym typeface="Arial"/>
       </a:defRPr>
     </a:lvl2pPr>
-    <a:lvl3pPr lvl="2" marR="0" rtl="0" algn="l">
+    <a:lvl3pPr marR="0" lvl="2" algn="l" rtl="0">
       <a:lnSpc>
         <a:spcPct val="100000"/>
       </a:lnSpc>
@@ -531,7 +546,7 @@
         <a:srgbClr val="000000"/>
       </a:buClr>
       <a:buFont typeface="Arial"/>
-      <a:defRPr b="0" i="0" sz="1400" u="none" cap="none" strike="noStrike">
+      <a:defRPr sz="1400" b="0" i="0" u="none" strike="noStrike" cap="none">
         <a:solidFill>
           <a:srgbClr val="000000"/>
         </a:solidFill>
@@ -541,7 +556,7 @@
         <a:sym typeface="Arial"/>
       </a:defRPr>
     </a:lvl3pPr>
-    <a:lvl4pPr lvl="3" marR="0" rtl="0" algn="l">
+    <a:lvl4pPr marR="0" lvl="3" algn="l" rtl="0">
       <a:lnSpc>
         <a:spcPct val="100000"/>
       </a:lnSpc>
@@ -555,7 +570,7 @@
         <a:srgbClr val="000000"/>
       </a:buClr>
       <a:buFont typeface="Arial"/>
-      <a:defRPr b="0" i="0" sz="1400" u="none" cap="none" strike="noStrike">
+      <a:defRPr sz="1400" b="0" i="0" u="none" strike="noStrike" cap="none">
         <a:solidFill>
           <a:srgbClr val="000000"/>
         </a:solidFill>
@@ -565,7 +580,7 @@
         <a:sym typeface="Arial"/>
       </a:defRPr>
     </a:lvl4pPr>
-    <a:lvl5pPr lvl="4" marR="0" rtl="0" algn="l">
+    <a:lvl5pPr marR="0" lvl="4" algn="l" rtl="0">
       <a:lnSpc>
         <a:spcPct val="100000"/>
       </a:lnSpc>
@@ -579,7 +594,7 @@
         <a:srgbClr val="000000"/>
       </a:buClr>
       <a:buFont typeface="Arial"/>
-      <a:defRPr b="0" i="0" sz="1400" u="none" cap="none" strike="noStrike">
+      <a:defRPr sz="1400" b="0" i="0" u="none" strike="noStrike" cap="none">
         <a:solidFill>
           <a:srgbClr val="000000"/>
         </a:solidFill>
@@ -589,7 +604,7 @@
         <a:sym typeface="Arial"/>
       </a:defRPr>
     </a:lvl5pPr>
-    <a:lvl6pPr lvl="5" marR="0" rtl="0" algn="l">
+    <a:lvl6pPr marR="0" lvl="5" algn="l" rtl="0">
       <a:lnSpc>
         <a:spcPct val="100000"/>
       </a:lnSpc>
@@ -603,7 +618,7 @@
         <a:srgbClr val="000000"/>
       </a:buClr>
       <a:buFont typeface="Arial"/>
-      <a:defRPr b="0" i="0" sz="1400" u="none" cap="none" strike="noStrike">
+      <a:defRPr sz="1400" b="0" i="0" u="none" strike="noStrike" cap="none">
         <a:solidFill>
           <a:srgbClr val="000000"/>
         </a:solidFill>
@@ -613,7 +628,7 @@
         <a:sym typeface="Arial"/>
       </a:defRPr>
     </a:lvl6pPr>
-    <a:lvl7pPr lvl="6" marR="0" rtl="0" algn="l">
+    <a:lvl7pPr marR="0" lvl="6" algn="l" rtl="0">
       <a:lnSpc>
         <a:spcPct val="100000"/>
       </a:lnSpc>
@@ -627,7 +642,7 @@
         <a:srgbClr val="000000"/>
       </a:buClr>
       <a:buFont typeface="Arial"/>
-      <a:defRPr b="0" i="0" sz="1400" u="none" cap="none" strike="noStrike">
+      <a:defRPr sz="1400" b="0" i="0" u="none" strike="noStrike" cap="none">
         <a:solidFill>
           <a:srgbClr val="000000"/>
         </a:solidFill>
@@ -637,7 +652,7 @@
         <a:sym typeface="Arial"/>
       </a:defRPr>
     </a:lvl7pPr>
-    <a:lvl8pPr lvl="7" marR="0" rtl="0" algn="l">
+    <a:lvl8pPr marR="0" lvl="7" algn="l" rtl="0">
       <a:lnSpc>
         <a:spcPct val="100000"/>
       </a:lnSpc>
@@ -651,7 +666,7 @@
         <a:srgbClr val="000000"/>
       </a:buClr>
       <a:buFont typeface="Arial"/>
-      <a:defRPr b="0" i="0" sz="1400" u="none" cap="none" strike="noStrike">
+      <a:defRPr sz="1400" b="0" i="0" u="none" strike="noStrike" cap="none">
         <a:solidFill>
           <a:srgbClr val="000000"/>
         </a:solidFill>
@@ -661,7 +676,7 @@
         <a:sym typeface="Arial"/>
       </a:defRPr>
     </a:lvl8pPr>
-    <a:lvl9pPr lvl="8" marR="0" rtl="0" algn="l">
+    <a:lvl9pPr marR="0" lvl="8" algn="l" rtl="0">
       <a:lnSpc>
         <a:spcPct val="100000"/>
       </a:lnSpc>
@@ -675,7 +690,7 @@
         <a:srgbClr val="000000"/>
       </a:buClr>
       <a:buFont typeface="Arial"/>
-      <a:defRPr b="0" i="0" sz="1400" u="none" cap="none" strike="noStrike">
+      <a:defRPr sz="1400" b="0" i="0" u="none" strike="noStrike" cap="none">
         <a:solidFill>
           <a:srgbClr val="000000"/>
         </a:solidFill>
@@ -690,11 +705,11 @@
 </file>
 
 <file path=ppt/notesSlides/notesSlide1.xml><?xml version="1.0" encoding="utf-8"?>
-<p:notes xmlns:a="http://schemas.openxmlformats.org/drawingml/2006/main" xmlns:r="http://schemas.openxmlformats.org/officeDocument/2006/relationships" xmlns:mc="http://schemas.openxmlformats.org/markup-compatibility/2006" xmlns:mv="urn:schemas-microsoft-com:mac:vml" xmlns:p="http://schemas.openxmlformats.org/presentationml/2006/main" xmlns:c="http://schemas.openxmlformats.org/drawingml/2006/chart" xmlns:dgm="http://schemas.openxmlformats.org/drawingml/2006/diagram" xmlns:o="urn:schemas-microsoft-com:office:office" xmlns:v="urn:schemas-microsoft-com:vml" xmlns:pvml="urn:schemas-microsoft-com:office:powerpoint" xmlns:com="http://schemas.openxmlformats.org/drawingml/2006/compatibility" xmlns:p14="http://schemas.microsoft.com/office/powerpoint/2010/main" xmlns:p15="http://schemas.microsoft.com/office/powerpoint/2012/main" xmlns:ahyp="http://schemas.microsoft.com/office/drawing/2018/hyperlinkcolor" showMasterPhAnim="0" showMasterSp="0">
+<p:notes xmlns:a="http://schemas.openxmlformats.org/drawingml/2006/main" xmlns:r="http://schemas.openxmlformats.org/officeDocument/2006/relationships" xmlns:p="http://schemas.openxmlformats.org/presentationml/2006/main" showMasterSp="0" showMasterPhAnim="0">
   <p:cSld>
     <p:spTree>
       <p:nvGrpSpPr>
-        <p:cNvPr id="50" name="Shape 50"/>
+        <p:cNvPr id="1" name="Shape 50"/>
         <p:cNvGrpSpPr/>
         <p:nvPr/>
       </p:nvGrpSpPr>
@@ -709,20 +724,26 @@
       <p:sp>
         <p:nvSpPr>
           <p:cNvPr id="51" name="Google Shape;51;p:notes"/>
-          <p:cNvSpPr/>
+          <p:cNvSpPr>
+            <a:spLocks noGrp="1" noRot="1" noChangeAspect="1"/>
+          </p:cNvSpPr>
           <p:nvPr>
-            <p:ph idx="2" type="sldImg"/>
+            <p:ph type="sldImg" idx="2"/>
           </p:nvPr>
         </p:nvSpPr>
         <p:spPr>
           <a:xfrm>
-            <a:off x="381300" y="685800"/>
-            <a:ext cx="6096075" cy="3429000"/>
+            <a:off x="381000" y="685800"/>
+            <a:ext cx="6096000" cy="3429000"/>
           </a:xfrm>
           <a:custGeom>
-            <a:rect b="b" l="l" r="r" t="t"/>
+            <a:avLst/>
+            <a:gdLst/>
+            <a:ahLst/>
+            <a:cxnLst/>
+            <a:rect l="l" t="t" r="r" b="b"/>
             <a:pathLst>
-              <a:path extrusionOk="0" h="120000" w="120000">
+              <a:path w="120000" h="120000" extrusionOk="0">
                 <a:moveTo>
                   <a:pt x="0" y="0"/>
                 </a:moveTo>
@@ -744,9 +765,11 @@
       <p:sp>
         <p:nvSpPr>
           <p:cNvPr id="52" name="Google Shape;52;p:notes"/>
-          <p:cNvSpPr txBox="1"/>
+          <p:cNvSpPr txBox="1">
+            <a:spLocks noGrp="1"/>
+          </p:cNvSpPr>
           <p:nvPr>
-            <p:ph idx="1" type="body"/>
+            <p:ph type="body" idx="1"/>
           </p:nvPr>
         </p:nvSpPr>
         <p:spPr>
@@ -759,12 +782,12 @@
           </a:prstGeom>
         </p:spPr>
         <p:txBody>
-          <a:bodyPr anchorCtr="0" anchor="t" bIns="91425" lIns="91425" spcFirstLastPara="1" rIns="91425" wrap="square" tIns="91425">
+          <a:bodyPr spcFirstLastPara="1" wrap="square" lIns="91425" tIns="91425" rIns="91425" bIns="91425" anchor="t" anchorCtr="0">
             <a:noAutofit/>
           </a:bodyPr>
           <a:lstStyle/>
           <a:p>
-            <a:pPr indent="0" lvl="0" marL="0" rtl="0" algn="l">
+            <a:pPr marL="0" lvl="0" indent="0" algn="l" rtl="0">
               <a:spcBef>
                 <a:spcPts val="0"/>
               </a:spcBef>
@@ -773,9 +796,6 @@
               </a:spcAft>
               <a:buNone/>
             </a:pPr>
-            <a:r>
-              <a:t/>
-            </a:r>
             <a:endParaRPr/>
           </a:p>
         </p:txBody>
@@ -789,11 +809,11 @@
 </file>
 
 <file path=ppt/notesSlides/notesSlide2.xml><?xml version="1.0" encoding="utf-8"?>
-<p:notes xmlns:a="http://schemas.openxmlformats.org/drawingml/2006/main" xmlns:r="http://schemas.openxmlformats.org/officeDocument/2006/relationships" xmlns:mc="http://schemas.openxmlformats.org/markup-compatibility/2006" xmlns:mv="urn:schemas-microsoft-com:mac:vml" xmlns:p="http://schemas.openxmlformats.org/presentationml/2006/main" xmlns:c="http://schemas.openxmlformats.org/drawingml/2006/chart" xmlns:dgm="http://schemas.openxmlformats.org/drawingml/2006/diagram" xmlns:o="urn:schemas-microsoft-com:office:office" xmlns:v="urn:schemas-microsoft-com:vml" xmlns:pvml="urn:schemas-microsoft-com:office:powerpoint" xmlns:com="http://schemas.openxmlformats.org/drawingml/2006/compatibility" xmlns:p14="http://schemas.microsoft.com/office/powerpoint/2010/main" xmlns:p15="http://schemas.microsoft.com/office/powerpoint/2012/main" xmlns:ahyp="http://schemas.microsoft.com/office/drawing/2018/hyperlinkcolor" showMasterPhAnim="0" showMasterSp="0">
+<p:notes xmlns:a="http://schemas.openxmlformats.org/drawingml/2006/main" xmlns:r="http://schemas.openxmlformats.org/officeDocument/2006/relationships" xmlns:p="http://schemas.openxmlformats.org/presentationml/2006/main" showMasterSp="0" showMasterPhAnim="0">
   <p:cSld>
     <p:spTree>
       <p:nvGrpSpPr>
-        <p:cNvPr id="56" name="Shape 56"/>
+        <p:cNvPr id="1" name="Shape 56"/>
         <p:cNvGrpSpPr/>
         <p:nvPr/>
       </p:nvGrpSpPr>
@@ -808,9 +828,11 @@
       <p:sp>
         <p:nvSpPr>
           <p:cNvPr id="57" name="Google Shape;57;g12ae9406bcc_2_0:notes"/>
-          <p:cNvSpPr/>
+          <p:cNvSpPr>
+            <a:spLocks noGrp="1" noRot="1" noChangeAspect="1"/>
+          </p:cNvSpPr>
           <p:nvPr>
-            <p:ph idx="2" type="sldImg"/>
+            <p:ph type="sldImg" idx="2"/>
           </p:nvPr>
         </p:nvSpPr>
         <p:spPr>
@@ -819,9 +841,13 @@
             <a:ext cx="6096000" cy="3429000"/>
           </a:xfrm>
           <a:custGeom>
-            <a:rect b="b" l="l" r="r" t="t"/>
+            <a:avLst/>
+            <a:gdLst/>
+            <a:ahLst/>
+            <a:cxnLst/>
+            <a:rect l="l" t="t" r="r" b="b"/>
             <a:pathLst>
-              <a:path extrusionOk="0" h="120000" w="120000">
+              <a:path w="120000" h="120000" extrusionOk="0">
                 <a:moveTo>
                   <a:pt x="0" y="0"/>
                 </a:moveTo>
@@ -843,9 +869,11 @@
       <p:sp>
         <p:nvSpPr>
           <p:cNvPr id="58" name="Google Shape;58;g12ae9406bcc_2_0:notes"/>
-          <p:cNvSpPr txBox="1"/>
+          <p:cNvSpPr txBox="1">
+            <a:spLocks noGrp="1"/>
+          </p:cNvSpPr>
           <p:nvPr>
-            <p:ph idx="1" type="body"/>
+            <p:ph type="body" idx="1"/>
           </p:nvPr>
         </p:nvSpPr>
         <p:spPr>
@@ -858,12 +886,12 @@
           </a:prstGeom>
         </p:spPr>
         <p:txBody>
-          <a:bodyPr anchorCtr="0" anchor="t" bIns="91425" lIns="91425" spcFirstLastPara="1" rIns="91425" wrap="square" tIns="91425">
+          <a:bodyPr spcFirstLastPara="1" wrap="square" lIns="91425" tIns="91425" rIns="91425" bIns="91425" anchor="t" anchorCtr="0">
             <a:noAutofit/>
           </a:bodyPr>
           <a:lstStyle/>
           <a:p>
-            <a:pPr indent="0" lvl="0" marL="0" rtl="0" algn="l">
+            <a:pPr marL="0" lvl="0" indent="0" algn="l" rtl="0">
               <a:spcBef>
                 <a:spcPts val="0"/>
               </a:spcBef>
@@ -872,9 +900,6 @@
               </a:spcAft>
               <a:buNone/>
             </a:pPr>
-            <a:r>
-              <a:t/>
-            </a:r>
             <a:endParaRPr/>
           </a:p>
         </p:txBody>
@@ -888,11 +913,11 @@
 </file>
 
 <file path=ppt/notesSlides/notesSlide3.xml><?xml version="1.0" encoding="utf-8"?>
-<p:notes xmlns:a="http://schemas.openxmlformats.org/drawingml/2006/main" xmlns:r="http://schemas.openxmlformats.org/officeDocument/2006/relationships" xmlns:mc="http://schemas.openxmlformats.org/markup-compatibility/2006" xmlns:mv="urn:schemas-microsoft-com:mac:vml" xmlns:p="http://schemas.openxmlformats.org/presentationml/2006/main" xmlns:c="http://schemas.openxmlformats.org/drawingml/2006/chart" xmlns:dgm="http://schemas.openxmlformats.org/drawingml/2006/diagram" xmlns:o="urn:schemas-microsoft-com:office:office" xmlns:v="urn:schemas-microsoft-com:vml" xmlns:pvml="urn:schemas-microsoft-com:office:powerpoint" xmlns:com="http://schemas.openxmlformats.org/drawingml/2006/compatibility" xmlns:p14="http://schemas.microsoft.com/office/powerpoint/2010/main" xmlns:p15="http://schemas.microsoft.com/office/powerpoint/2012/main" xmlns:ahyp="http://schemas.microsoft.com/office/drawing/2018/hyperlinkcolor" showMasterPhAnim="0" showMasterSp="0">
+<p:notes xmlns:a="http://schemas.openxmlformats.org/drawingml/2006/main" xmlns:r="http://schemas.openxmlformats.org/officeDocument/2006/relationships" xmlns:p="http://schemas.openxmlformats.org/presentationml/2006/main" showMasterSp="0" showMasterPhAnim="0">
   <p:cSld>
     <p:spTree>
       <p:nvGrpSpPr>
-        <p:cNvPr id="62" name="Shape 62"/>
+        <p:cNvPr id="1" name="Shape 62"/>
         <p:cNvGrpSpPr/>
         <p:nvPr/>
       </p:nvGrpSpPr>
@@ -907,9 +932,11 @@
       <p:sp>
         <p:nvSpPr>
           <p:cNvPr id="63" name="Google Shape;63;g12ae9406bcc_2_10:notes"/>
-          <p:cNvSpPr/>
+          <p:cNvSpPr>
+            <a:spLocks noGrp="1" noRot="1" noChangeAspect="1"/>
+          </p:cNvSpPr>
           <p:nvPr>
-            <p:ph idx="2" type="sldImg"/>
+            <p:ph type="sldImg" idx="2"/>
           </p:nvPr>
         </p:nvSpPr>
         <p:spPr>
@@ -918,9 +945,13 @@
             <a:ext cx="6096000" cy="3429000"/>
           </a:xfrm>
           <a:custGeom>
-            <a:rect b="b" l="l" r="r" t="t"/>
+            <a:avLst/>
+            <a:gdLst/>
+            <a:ahLst/>
+            <a:cxnLst/>
+            <a:rect l="l" t="t" r="r" b="b"/>
             <a:pathLst>
-              <a:path extrusionOk="0" h="120000" w="120000">
+              <a:path w="120000" h="120000" extrusionOk="0">
                 <a:moveTo>
                   <a:pt x="0" y="0"/>
                 </a:moveTo>
@@ -942,9 +973,11 @@
       <p:sp>
         <p:nvSpPr>
           <p:cNvPr id="64" name="Google Shape;64;g12ae9406bcc_2_10:notes"/>
-          <p:cNvSpPr txBox="1"/>
+          <p:cNvSpPr txBox="1">
+            <a:spLocks noGrp="1"/>
+          </p:cNvSpPr>
           <p:nvPr>
-            <p:ph idx="1" type="body"/>
+            <p:ph type="body" idx="1"/>
           </p:nvPr>
         </p:nvSpPr>
         <p:spPr>
@@ -957,12 +990,12 @@
           </a:prstGeom>
         </p:spPr>
         <p:txBody>
-          <a:bodyPr anchorCtr="0" anchor="t" bIns="91425" lIns="91425" spcFirstLastPara="1" rIns="91425" wrap="square" tIns="91425">
+          <a:bodyPr spcFirstLastPara="1" wrap="square" lIns="91425" tIns="91425" rIns="91425" bIns="91425" anchor="t" anchorCtr="0">
             <a:noAutofit/>
           </a:bodyPr>
           <a:lstStyle/>
           <a:p>
-            <a:pPr indent="0" lvl="0" marL="0" rtl="0" algn="l">
+            <a:pPr marL="0" lvl="0" indent="0" algn="l" rtl="0">
               <a:spcBef>
                 <a:spcPts val="0"/>
               </a:spcBef>
@@ -971,9 +1004,6 @@
               </a:spcAft>
               <a:buNone/>
             </a:pPr>
-            <a:r>
-              <a:t/>
-            </a:r>
             <a:endParaRPr/>
           </a:p>
         </p:txBody>
@@ -987,11 +1017,11 @@
 </file>
 
 <file path=ppt/notesSlides/notesSlide4.xml><?xml version="1.0" encoding="utf-8"?>
-<p:notes xmlns:a="http://schemas.openxmlformats.org/drawingml/2006/main" xmlns:r="http://schemas.openxmlformats.org/officeDocument/2006/relationships" xmlns:mc="http://schemas.openxmlformats.org/markup-compatibility/2006" xmlns:mv="urn:schemas-microsoft-com:mac:vml" xmlns:p="http://schemas.openxmlformats.org/presentationml/2006/main" xmlns:c="http://schemas.openxmlformats.org/drawingml/2006/chart" xmlns:dgm="http://schemas.openxmlformats.org/drawingml/2006/diagram" xmlns:o="urn:schemas-microsoft-com:office:office" xmlns:v="urn:schemas-microsoft-com:vml" xmlns:pvml="urn:schemas-microsoft-com:office:powerpoint" xmlns:com="http://schemas.openxmlformats.org/drawingml/2006/compatibility" xmlns:p14="http://schemas.microsoft.com/office/powerpoint/2010/main" xmlns:p15="http://schemas.microsoft.com/office/powerpoint/2012/main" xmlns:ahyp="http://schemas.microsoft.com/office/drawing/2018/hyperlinkcolor" showMasterPhAnim="0" showMasterSp="0">
+<p:notes xmlns:a="http://schemas.openxmlformats.org/drawingml/2006/main" xmlns:r="http://schemas.openxmlformats.org/officeDocument/2006/relationships" xmlns:p="http://schemas.openxmlformats.org/presentationml/2006/main" showMasterSp="0" showMasterPhAnim="0">
   <p:cSld>
     <p:spTree>
       <p:nvGrpSpPr>
-        <p:cNvPr id="68" name="Shape 68"/>
+        <p:cNvPr id="1" name="Shape 68"/>
         <p:cNvGrpSpPr/>
         <p:nvPr/>
       </p:nvGrpSpPr>
@@ -1006,9 +1036,11 @@
       <p:sp>
         <p:nvSpPr>
           <p:cNvPr id="69" name="Google Shape;69;g12ae9406bcc_2_5:notes"/>
-          <p:cNvSpPr/>
+          <p:cNvSpPr>
+            <a:spLocks noGrp="1" noRot="1" noChangeAspect="1"/>
+          </p:cNvSpPr>
           <p:nvPr>
-            <p:ph idx="2" type="sldImg"/>
+            <p:ph type="sldImg" idx="2"/>
           </p:nvPr>
         </p:nvSpPr>
         <p:spPr>
@@ -1017,9 +1049,13 @@
             <a:ext cx="6096000" cy="3429000"/>
           </a:xfrm>
           <a:custGeom>
-            <a:rect b="b" l="l" r="r" t="t"/>
+            <a:avLst/>
+            <a:gdLst/>
+            <a:ahLst/>
+            <a:cxnLst/>
+            <a:rect l="l" t="t" r="r" b="b"/>
             <a:pathLst>
-              <a:path extrusionOk="0" h="120000" w="120000">
+              <a:path w="120000" h="120000" extrusionOk="0">
                 <a:moveTo>
                   <a:pt x="0" y="0"/>
                 </a:moveTo>
@@ -1041,9 +1077,11 @@
       <p:sp>
         <p:nvSpPr>
           <p:cNvPr id="70" name="Google Shape;70;g12ae9406bcc_2_5:notes"/>
-          <p:cNvSpPr txBox="1"/>
+          <p:cNvSpPr txBox="1">
+            <a:spLocks noGrp="1"/>
+          </p:cNvSpPr>
           <p:nvPr>
-            <p:ph idx="1" type="body"/>
+            <p:ph type="body" idx="1"/>
           </p:nvPr>
         </p:nvSpPr>
         <p:spPr>
@@ -1056,12 +1094,12 @@
           </a:prstGeom>
         </p:spPr>
         <p:txBody>
-          <a:bodyPr anchorCtr="0" anchor="t" bIns="91425" lIns="91425" spcFirstLastPara="1" rIns="91425" wrap="square" tIns="91425">
+          <a:bodyPr spcFirstLastPara="1" wrap="square" lIns="91425" tIns="91425" rIns="91425" bIns="91425" anchor="t" anchorCtr="0">
             <a:noAutofit/>
           </a:bodyPr>
           <a:lstStyle/>
           <a:p>
-            <a:pPr indent="0" lvl="0" marL="0" rtl="0" algn="l">
+            <a:pPr marL="0" lvl="0" indent="0" algn="l" rtl="0">
               <a:spcBef>
                 <a:spcPts val="0"/>
               </a:spcBef>
@@ -1070,9 +1108,6 @@
               </a:spcAft>
               <a:buNone/>
             </a:pPr>
-            <a:r>
-              <a:t/>
-            </a:r>
             <a:endParaRPr/>
           </a:p>
         </p:txBody>
@@ -1086,11 +1121,11 @@
 </file>
 
 <file path=ppt/slideLayouts/slideLayout1.xml><?xml version="1.0" encoding="utf-8"?>
-<p:sldLayout xmlns:a="http://schemas.openxmlformats.org/drawingml/2006/main" xmlns:r="http://schemas.openxmlformats.org/officeDocument/2006/relationships" xmlns:mc="http://schemas.openxmlformats.org/markup-compatibility/2006" xmlns:mv="urn:schemas-microsoft-com:mac:vml" xmlns:p="http://schemas.openxmlformats.org/presentationml/2006/main" xmlns:c="http://schemas.openxmlformats.org/drawingml/2006/chart" xmlns:dgm="http://schemas.openxmlformats.org/drawingml/2006/diagram" xmlns:o="urn:schemas-microsoft-com:office:office" xmlns:v="urn:schemas-microsoft-com:vml" xmlns:pvml="urn:schemas-microsoft-com:office:powerpoint" xmlns:com="http://schemas.openxmlformats.org/drawingml/2006/compatibility" xmlns:p14="http://schemas.microsoft.com/office/powerpoint/2010/main" xmlns:p15="http://schemas.microsoft.com/office/powerpoint/2012/main" xmlns:ahyp="http://schemas.microsoft.com/office/drawing/2018/hyperlinkcolor" matchingName="Title slide" type="title">
+<p:sldLayout xmlns:a="http://schemas.openxmlformats.org/drawingml/2006/main" xmlns:r="http://schemas.openxmlformats.org/officeDocument/2006/relationships" xmlns:p="http://schemas.openxmlformats.org/presentationml/2006/main" matchingName="Title slide" type="title">
   <p:cSld name="TITLE">
     <p:spTree>
       <p:nvGrpSpPr>
-        <p:cNvPr id="9" name="Shape 9"/>
+        <p:cNvPr id="1" name="Shape 9"/>
         <p:cNvGrpSpPr/>
         <p:nvPr/>
       </p:nvGrpSpPr>
@@ -1105,7 +1140,9 @@
       <p:sp>
         <p:nvSpPr>
           <p:cNvPr id="10" name="Google Shape;10;p2"/>
-          <p:cNvSpPr txBox="1"/>
+          <p:cNvSpPr txBox="1">
+            <a:spLocks noGrp="1"/>
+          </p:cNvSpPr>
           <p:nvPr>
             <p:ph type="ctrTitle"/>
           </p:nvPr>
@@ -1120,7 +1157,7 @@
           </a:prstGeom>
         </p:spPr>
         <p:txBody>
-          <a:bodyPr anchorCtr="0" anchor="b" bIns="91425" lIns="91425" spcFirstLastPara="1" rIns="91425" wrap="square" tIns="91425">
+          <a:bodyPr spcFirstLastPara="1" wrap="square" lIns="91425" tIns="91425" rIns="91425" bIns="91425" anchor="b" anchorCtr="0">
             <a:normAutofit/>
           </a:bodyPr>
           <a:lstStyle>
@@ -1224,15 +1261,19 @@
               <a:defRPr sz="5200"/>
             </a:lvl9pPr>
           </a:lstStyle>
-          <a:p/>
+          <a:p>
+            <a:endParaRPr/>
+          </a:p>
         </p:txBody>
       </p:sp>
       <p:sp>
         <p:nvSpPr>
           <p:cNvPr id="11" name="Google Shape;11;p2"/>
-          <p:cNvSpPr txBox="1"/>
+          <p:cNvSpPr txBox="1">
+            <a:spLocks noGrp="1"/>
+          </p:cNvSpPr>
           <p:nvPr>
-            <p:ph idx="1" type="subTitle"/>
+            <p:ph type="subTitle" idx="1"/>
           </p:nvPr>
         </p:nvSpPr>
         <p:spPr>
@@ -1245,7 +1286,7 @@
           </a:prstGeom>
         </p:spPr>
         <p:txBody>
-          <a:bodyPr anchorCtr="0" anchor="t" bIns="91425" lIns="91425" spcFirstLastPara="1" rIns="91425" wrap="square" tIns="91425">
+          <a:bodyPr spcFirstLastPara="1" wrap="square" lIns="91425" tIns="91425" rIns="91425" bIns="91425" anchor="t" anchorCtr="0">
             <a:normAutofit/>
           </a:bodyPr>
           <a:lstStyle>
@@ -1376,15 +1417,19 @@
               <a:defRPr sz="2800"/>
             </a:lvl9pPr>
           </a:lstStyle>
-          <a:p/>
+          <a:p>
+            <a:endParaRPr/>
+          </a:p>
         </p:txBody>
       </p:sp>
       <p:sp>
         <p:nvSpPr>
           <p:cNvPr id="12" name="Google Shape;12;p2"/>
-          <p:cNvSpPr txBox="1"/>
+          <p:cNvSpPr txBox="1">
+            <a:spLocks noGrp="1"/>
+          </p:cNvSpPr>
           <p:nvPr>
-            <p:ph idx="12" type="sldNum"/>
+            <p:ph type="sldNum" idx="12"/>
           </p:nvPr>
         </p:nvSpPr>
         <p:spPr>
@@ -1397,7 +1442,7 @@
           </a:prstGeom>
         </p:spPr>
         <p:txBody>
-          <a:bodyPr anchorCtr="0" anchor="ctr" bIns="91425" lIns="91425" spcFirstLastPara="1" rIns="91425" wrap="square" tIns="91425">
+          <a:bodyPr spcFirstLastPara="1" wrap="square" lIns="91425" tIns="91425" rIns="91425" bIns="91425" anchor="ctr" anchorCtr="0">
             <a:normAutofit/>
           </a:bodyPr>
           <a:lstStyle>
@@ -1439,7 +1484,7 @@
             </a:lvl9pPr>
           </a:lstStyle>
           <a:p>
-            <a:pPr indent="0" lvl="0" marL="0" rtl="0" algn="r">
+            <a:pPr marL="0" lvl="0" indent="0" algn="r" rtl="0">
               <a:spcBef>
                 <a:spcPts val="0"/>
               </a:spcBef>
@@ -1465,11 +1510,11 @@
 </file>
 
 <file path=ppt/slideLayouts/slideLayout10.xml><?xml version="1.0" encoding="utf-8"?>
-<p:sldLayout xmlns:a="http://schemas.openxmlformats.org/drawingml/2006/main" xmlns:r="http://schemas.openxmlformats.org/officeDocument/2006/relationships" xmlns:mc="http://schemas.openxmlformats.org/markup-compatibility/2006" xmlns:mv="urn:schemas-microsoft-com:mac:vml" xmlns:p="http://schemas.openxmlformats.org/presentationml/2006/main" xmlns:c="http://schemas.openxmlformats.org/drawingml/2006/chart" xmlns:dgm="http://schemas.openxmlformats.org/drawingml/2006/diagram" xmlns:o="urn:schemas-microsoft-com:office:office" xmlns:v="urn:schemas-microsoft-com:vml" xmlns:pvml="urn:schemas-microsoft-com:office:powerpoint" xmlns:com="http://schemas.openxmlformats.org/drawingml/2006/compatibility" xmlns:p14="http://schemas.microsoft.com/office/powerpoint/2010/main" xmlns:p15="http://schemas.microsoft.com/office/powerpoint/2012/main" xmlns:ahyp="http://schemas.microsoft.com/office/drawing/2018/hyperlinkcolor" matchingName="Big number">
+<p:sldLayout xmlns:a="http://schemas.openxmlformats.org/drawingml/2006/main" xmlns:r="http://schemas.openxmlformats.org/officeDocument/2006/relationships" xmlns:p="http://schemas.openxmlformats.org/presentationml/2006/main" matchingName="Big number">
   <p:cSld name="BIG_NUMBER">
     <p:spTree>
       <p:nvGrpSpPr>
-        <p:cNvPr id="44" name="Shape 44"/>
+        <p:cNvPr id="1" name="Shape 44"/>
         <p:cNvGrpSpPr/>
         <p:nvPr/>
       </p:nvGrpSpPr>
@@ -1484,9 +1529,11 @@
       <p:sp>
         <p:nvSpPr>
           <p:cNvPr id="45" name="Google Shape;45;p11"/>
-          <p:cNvSpPr txBox="1"/>
+          <p:cNvSpPr txBox="1">
+            <a:spLocks noGrp="1"/>
+          </p:cNvSpPr>
           <p:nvPr>
-            <p:ph hasCustomPrompt="1" type="title"/>
+            <p:ph type="title" hasCustomPrompt="1"/>
           </p:nvPr>
         </p:nvSpPr>
         <p:spPr>
@@ -1499,7 +1546,7 @@
           </a:prstGeom>
         </p:spPr>
         <p:txBody>
-          <a:bodyPr anchorCtr="0" anchor="b" bIns="91425" lIns="91425" spcFirstLastPara="1" rIns="91425" wrap="square" tIns="91425">
+          <a:bodyPr spcFirstLastPara="1" wrap="square" lIns="91425" tIns="91425" rIns="91425" bIns="91425" anchor="b" anchorCtr="0">
             <a:normAutofit/>
           </a:bodyPr>
           <a:lstStyle>
@@ -1613,9 +1660,11 @@
       <p:sp>
         <p:nvSpPr>
           <p:cNvPr id="46" name="Google Shape;46;p11"/>
-          <p:cNvSpPr txBox="1"/>
+          <p:cNvSpPr txBox="1">
+            <a:spLocks noGrp="1"/>
+          </p:cNvSpPr>
           <p:nvPr>
-            <p:ph idx="1" type="body"/>
+            <p:ph type="body" idx="1"/>
           </p:nvPr>
         </p:nvSpPr>
         <p:spPr>
@@ -1628,11 +1677,11 @@
           </a:prstGeom>
         </p:spPr>
         <p:txBody>
-          <a:bodyPr anchorCtr="0" anchor="t" bIns="91425" lIns="91425" spcFirstLastPara="1" rIns="91425" wrap="square" tIns="91425">
+          <a:bodyPr spcFirstLastPara="1" wrap="square" lIns="91425" tIns="91425" rIns="91425" bIns="91425" anchor="t" anchorCtr="0">
             <a:normAutofit/>
           </a:bodyPr>
           <a:lstStyle>
-            <a:lvl1pPr indent="-342900" lvl="0" marL="457200" algn="ctr">
+            <a:lvl1pPr marL="457200" lvl="0" indent="-342900" algn="ctr">
               <a:spcBef>
                 <a:spcPts val="0"/>
               </a:spcBef>
@@ -1643,7 +1692,7 @@
               <a:buChar char="●"/>
               <a:defRPr/>
             </a:lvl1pPr>
-            <a:lvl2pPr indent="-317500" lvl="1" marL="914400" algn="ctr">
+            <a:lvl2pPr marL="914400" lvl="1" indent="-317500" algn="ctr">
               <a:spcBef>
                 <a:spcPts val="0"/>
               </a:spcBef>
@@ -1654,7 +1703,7 @@
               <a:buChar char="○"/>
               <a:defRPr/>
             </a:lvl2pPr>
-            <a:lvl3pPr indent="-317500" lvl="2" marL="1371600" algn="ctr">
+            <a:lvl3pPr marL="1371600" lvl="2" indent="-317500" algn="ctr">
               <a:spcBef>
                 <a:spcPts val="0"/>
               </a:spcBef>
@@ -1665,7 +1714,7 @@
               <a:buChar char="■"/>
               <a:defRPr/>
             </a:lvl3pPr>
-            <a:lvl4pPr indent="-317500" lvl="3" marL="1828800" algn="ctr">
+            <a:lvl4pPr marL="1828800" lvl="3" indent="-317500" algn="ctr">
               <a:spcBef>
                 <a:spcPts val="0"/>
               </a:spcBef>
@@ -1676,7 +1725,7 @@
               <a:buChar char="●"/>
               <a:defRPr/>
             </a:lvl4pPr>
-            <a:lvl5pPr indent="-317500" lvl="4" marL="2286000" algn="ctr">
+            <a:lvl5pPr marL="2286000" lvl="4" indent="-317500" algn="ctr">
               <a:spcBef>
                 <a:spcPts val="0"/>
               </a:spcBef>
@@ -1687,7 +1736,7 @@
               <a:buChar char="○"/>
               <a:defRPr/>
             </a:lvl5pPr>
-            <a:lvl6pPr indent="-317500" lvl="5" marL="2743200" algn="ctr">
+            <a:lvl6pPr marL="2743200" lvl="5" indent="-317500" algn="ctr">
               <a:spcBef>
                 <a:spcPts val="0"/>
               </a:spcBef>
@@ -1698,7 +1747,7 @@
               <a:buChar char="■"/>
               <a:defRPr/>
             </a:lvl6pPr>
-            <a:lvl7pPr indent="-317500" lvl="6" marL="3200400" algn="ctr">
+            <a:lvl7pPr marL="3200400" lvl="6" indent="-317500" algn="ctr">
               <a:spcBef>
                 <a:spcPts val="0"/>
               </a:spcBef>
@@ -1709,7 +1758,7 @@
               <a:buChar char="●"/>
               <a:defRPr/>
             </a:lvl7pPr>
-            <a:lvl8pPr indent="-317500" lvl="7" marL="3657600" algn="ctr">
+            <a:lvl8pPr marL="3657600" lvl="7" indent="-317500" algn="ctr">
               <a:spcBef>
                 <a:spcPts val="0"/>
               </a:spcBef>
@@ -1720,7 +1769,7 @@
               <a:buChar char="○"/>
               <a:defRPr/>
             </a:lvl8pPr>
-            <a:lvl9pPr indent="-317500" lvl="8" marL="4114800" algn="ctr">
+            <a:lvl9pPr marL="4114800" lvl="8" indent="-317500" algn="ctr">
               <a:spcBef>
                 <a:spcPts val="0"/>
               </a:spcBef>
@@ -1732,15 +1781,19 @@
               <a:defRPr/>
             </a:lvl9pPr>
           </a:lstStyle>
-          <a:p/>
+          <a:p>
+            <a:endParaRPr/>
+          </a:p>
         </p:txBody>
       </p:sp>
       <p:sp>
         <p:nvSpPr>
           <p:cNvPr id="47" name="Google Shape;47;p11"/>
-          <p:cNvSpPr txBox="1"/>
+          <p:cNvSpPr txBox="1">
+            <a:spLocks noGrp="1"/>
+          </p:cNvSpPr>
           <p:nvPr>
-            <p:ph idx="12" type="sldNum"/>
+            <p:ph type="sldNum" idx="12"/>
           </p:nvPr>
         </p:nvSpPr>
         <p:spPr>
@@ -1753,7 +1806,7 @@
           </a:prstGeom>
         </p:spPr>
         <p:txBody>
-          <a:bodyPr anchorCtr="0" anchor="ctr" bIns="91425" lIns="91425" spcFirstLastPara="1" rIns="91425" wrap="square" tIns="91425">
+          <a:bodyPr spcFirstLastPara="1" wrap="square" lIns="91425" tIns="91425" rIns="91425" bIns="91425" anchor="ctr" anchorCtr="0">
             <a:normAutofit/>
           </a:bodyPr>
           <a:lstStyle>
@@ -1795,7 +1848,7 @@
             </a:lvl9pPr>
           </a:lstStyle>
           <a:p>
-            <a:pPr indent="0" lvl="0" marL="0" rtl="0" algn="r">
+            <a:pPr marL="0" lvl="0" indent="0" algn="r" rtl="0">
               <a:spcBef>
                 <a:spcPts val="0"/>
               </a:spcBef>
@@ -1821,11 +1874,11 @@
 </file>
 
 <file path=ppt/slideLayouts/slideLayout11.xml><?xml version="1.0" encoding="utf-8"?>
-<p:sldLayout xmlns:a="http://schemas.openxmlformats.org/drawingml/2006/main" xmlns:r="http://schemas.openxmlformats.org/officeDocument/2006/relationships" xmlns:mc="http://schemas.openxmlformats.org/markup-compatibility/2006" xmlns:mv="urn:schemas-microsoft-com:mac:vml" xmlns:p="http://schemas.openxmlformats.org/presentationml/2006/main" xmlns:c="http://schemas.openxmlformats.org/drawingml/2006/chart" xmlns:dgm="http://schemas.openxmlformats.org/drawingml/2006/diagram" xmlns:o="urn:schemas-microsoft-com:office:office" xmlns:v="urn:schemas-microsoft-com:vml" xmlns:pvml="urn:schemas-microsoft-com:office:powerpoint" xmlns:com="http://schemas.openxmlformats.org/drawingml/2006/compatibility" xmlns:p14="http://schemas.microsoft.com/office/powerpoint/2010/main" xmlns:p15="http://schemas.microsoft.com/office/powerpoint/2012/main" xmlns:ahyp="http://schemas.microsoft.com/office/drawing/2018/hyperlinkcolor" matchingName="Blank" type="blank">
+<p:sldLayout xmlns:a="http://schemas.openxmlformats.org/drawingml/2006/main" xmlns:r="http://schemas.openxmlformats.org/officeDocument/2006/relationships" xmlns:p="http://schemas.openxmlformats.org/presentationml/2006/main" matchingName="Blank" type="blank">
   <p:cSld name="BLANK">
     <p:spTree>
       <p:nvGrpSpPr>
-        <p:cNvPr id="48" name="Shape 48"/>
+        <p:cNvPr id="1" name="Shape 48"/>
         <p:cNvGrpSpPr/>
         <p:nvPr/>
       </p:nvGrpSpPr>
@@ -1840,9 +1893,11 @@
       <p:sp>
         <p:nvSpPr>
           <p:cNvPr id="49" name="Google Shape;49;p12"/>
-          <p:cNvSpPr txBox="1"/>
+          <p:cNvSpPr txBox="1">
+            <a:spLocks noGrp="1"/>
+          </p:cNvSpPr>
           <p:nvPr>
-            <p:ph idx="12" type="sldNum"/>
+            <p:ph type="sldNum" idx="12"/>
           </p:nvPr>
         </p:nvSpPr>
         <p:spPr>
@@ -1855,7 +1910,7 @@
           </a:prstGeom>
         </p:spPr>
         <p:txBody>
-          <a:bodyPr anchorCtr="0" anchor="ctr" bIns="91425" lIns="91425" spcFirstLastPara="1" rIns="91425" wrap="square" tIns="91425">
+          <a:bodyPr spcFirstLastPara="1" wrap="square" lIns="91425" tIns="91425" rIns="91425" bIns="91425" anchor="ctr" anchorCtr="0">
             <a:normAutofit/>
           </a:bodyPr>
           <a:lstStyle>
@@ -1897,7 +1952,7 @@
             </a:lvl9pPr>
           </a:lstStyle>
           <a:p>
-            <a:pPr indent="0" lvl="0" marL="0" rtl="0" algn="r">
+            <a:pPr marL="0" lvl="0" indent="0" algn="r" rtl="0">
               <a:spcBef>
                 <a:spcPts val="0"/>
               </a:spcBef>
@@ -1923,11 +1978,11 @@
 </file>
 
 <file path=ppt/slideLayouts/slideLayout2.xml><?xml version="1.0" encoding="utf-8"?>
-<p:sldLayout xmlns:a="http://schemas.openxmlformats.org/drawingml/2006/main" xmlns:r="http://schemas.openxmlformats.org/officeDocument/2006/relationships" xmlns:mc="http://schemas.openxmlformats.org/markup-compatibility/2006" xmlns:mv="urn:schemas-microsoft-com:mac:vml" xmlns:p="http://schemas.openxmlformats.org/presentationml/2006/main" xmlns:c="http://schemas.openxmlformats.org/drawingml/2006/chart" xmlns:dgm="http://schemas.openxmlformats.org/drawingml/2006/diagram" xmlns:o="urn:schemas-microsoft-com:office:office" xmlns:v="urn:schemas-microsoft-com:vml" xmlns:pvml="urn:schemas-microsoft-com:office:powerpoint" xmlns:com="http://schemas.openxmlformats.org/drawingml/2006/compatibility" xmlns:p14="http://schemas.microsoft.com/office/powerpoint/2010/main" xmlns:p15="http://schemas.microsoft.com/office/powerpoint/2012/main" xmlns:ahyp="http://schemas.microsoft.com/office/drawing/2018/hyperlinkcolor" matchingName="Section header" type="secHead">
+<p:sldLayout xmlns:a="http://schemas.openxmlformats.org/drawingml/2006/main" xmlns:r="http://schemas.openxmlformats.org/officeDocument/2006/relationships" xmlns:p="http://schemas.openxmlformats.org/presentationml/2006/main" matchingName="Section header" type="secHead">
   <p:cSld name="SECTION_HEADER">
     <p:spTree>
       <p:nvGrpSpPr>
-        <p:cNvPr id="13" name="Shape 13"/>
+        <p:cNvPr id="1" name="Shape 13"/>
         <p:cNvGrpSpPr/>
         <p:nvPr/>
       </p:nvGrpSpPr>
@@ -1942,7 +1997,9 @@
       <p:sp>
         <p:nvSpPr>
           <p:cNvPr id="14" name="Google Shape;14;p3"/>
-          <p:cNvSpPr txBox="1"/>
+          <p:cNvSpPr txBox="1">
+            <a:spLocks noGrp="1"/>
+          </p:cNvSpPr>
           <p:nvPr>
             <p:ph type="title"/>
           </p:nvPr>
@@ -1957,7 +2014,7 @@
           </a:prstGeom>
         </p:spPr>
         <p:txBody>
-          <a:bodyPr anchorCtr="0" anchor="ctr" bIns="91425" lIns="91425" spcFirstLastPara="1" rIns="91425" wrap="square" tIns="91425">
+          <a:bodyPr spcFirstLastPara="1" wrap="square" lIns="91425" tIns="91425" rIns="91425" bIns="91425" anchor="ctr" anchorCtr="0">
             <a:normAutofit/>
           </a:bodyPr>
           <a:lstStyle>
@@ -2061,15 +2118,19 @@
               <a:defRPr sz="3600"/>
             </a:lvl9pPr>
           </a:lstStyle>
-          <a:p/>
+          <a:p>
+            <a:endParaRPr/>
+          </a:p>
         </p:txBody>
       </p:sp>
       <p:sp>
         <p:nvSpPr>
           <p:cNvPr id="15" name="Google Shape;15;p3"/>
-          <p:cNvSpPr txBox="1"/>
+          <p:cNvSpPr txBox="1">
+            <a:spLocks noGrp="1"/>
+          </p:cNvSpPr>
           <p:nvPr>
-            <p:ph idx="12" type="sldNum"/>
+            <p:ph type="sldNum" idx="12"/>
           </p:nvPr>
         </p:nvSpPr>
         <p:spPr>
@@ -2082,7 +2143,7 @@
           </a:prstGeom>
         </p:spPr>
         <p:txBody>
-          <a:bodyPr anchorCtr="0" anchor="ctr" bIns="91425" lIns="91425" spcFirstLastPara="1" rIns="91425" wrap="square" tIns="91425">
+          <a:bodyPr spcFirstLastPara="1" wrap="square" lIns="91425" tIns="91425" rIns="91425" bIns="91425" anchor="ctr" anchorCtr="0">
             <a:normAutofit/>
           </a:bodyPr>
           <a:lstStyle>
@@ -2124,7 +2185,7 @@
             </a:lvl9pPr>
           </a:lstStyle>
           <a:p>
-            <a:pPr indent="0" lvl="0" marL="0" rtl="0" algn="r">
+            <a:pPr marL="0" lvl="0" indent="0" algn="r" rtl="0">
               <a:spcBef>
                 <a:spcPts val="0"/>
               </a:spcBef>
@@ -2150,11 +2211,11 @@
 </file>
 
 <file path=ppt/slideLayouts/slideLayout3.xml><?xml version="1.0" encoding="utf-8"?>
-<p:sldLayout xmlns:a="http://schemas.openxmlformats.org/drawingml/2006/main" xmlns:r="http://schemas.openxmlformats.org/officeDocument/2006/relationships" xmlns:mc="http://schemas.openxmlformats.org/markup-compatibility/2006" xmlns:mv="urn:schemas-microsoft-com:mac:vml" xmlns:p="http://schemas.openxmlformats.org/presentationml/2006/main" xmlns:c="http://schemas.openxmlformats.org/drawingml/2006/chart" xmlns:dgm="http://schemas.openxmlformats.org/drawingml/2006/diagram" xmlns:o="urn:schemas-microsoft-com:office:office" xmlns:v="urn:schemas-microsoft-com:vml" xmlns:pvml="urn:schemas-microsoft-com:office:powerpoint" xmlns:com="http://schemas.openxmlformats.org/drawingml/2006/compatibility" xmlns:p14="http://schemas.microsoft.com/office/powerpoint/2010/main" xmlns:p15="http://schemas.microsoft.com/office/powerpoint/2012/main" xmlns:ahyp="http://schemas.microsoft.com/office/drawing/2018/hyperlinkcolor" matchingName="Title and body" type="tx">
+<p:sldLayout xmlns:a="http://schemas.openxmlformats.org/drawingml/2006/main" xmlns:r="http://schemas.openxmlformats.org/officeDocument/2006/relationships" xmlns:p="http://schemas.openxmlformats.org/presentationml/2006/main" matchingName="Title and body" type="tx">
   <p:cSld name="TITLE_AND_BODY">
     <p:spTree>
       <p:nvGrpSpPr>
-        <p:cNvPr id="16" name="Shape 16"/>
+        <p:cNvPr id="1" name="Shape 16"/>
         <p:cNvGrpSpPr/>
         <p:nvPr/>
       </p:nvGrpSpPr>
@@ -2169,7 +2230,9 @@
       <p:sp>
         <p:nvSpPr>
           <p:cNvPr id="17" name="Google Shape;17;p4"/>
-          <p:cNvSpPr txBox="1"/>
+          <p:cNvSpPr txBox="1">
+            <a:spLocks noGrp="1"/>
+          </p:cNvSpPr>
           <p:nvPr>
             <p:ph type="title"/>
           </p:nvPr>
@@ -2184,7 +2247,7 @@
           </a:prstGeom>
         </p:spPr>
         <p:txBody>
-          <a:bodyPr anchorCtr="0" anchor="t" bIns="91425" lIns="91425" spcFirstLastPara="1" rIns="91425" wrap="square" tIns="91425">
+          <a:bodyPr spcFirstLastPara="1" wrap="square" lIns="91425" tIns="91425" rIns="91425" bIns="91425" anchor="t" anchorCtr="0">
             <a:normAutofit/>
           </a:bodyPr>
           <a:lstStyle>
@@ -2288,15 +2351,19 @@
               <a:defRPr/>
             </a:lvl9pPr>
           </a:lstStyle>
-          <a:p/>
+          <a:p>
+            <a:endParaRPr/>
+          </a:p>
         </p:txBody>
       </p:sp>
       <p:sp>
         <p:nvSpPr>
           <p:cNvPr id="18" name="Google Shape;18;p4"/>
-          <p:cNvSpPr txBox="1"/>
+          <p:cNvSpPr txBox="1">
+            <a:spLocks noGrp="1"/>
+          </p:cNvSpPr>
           <p:nvPr>
-            <p:ph idx="1" type="body"/>
+            <p:ph type="body" idx="1"/>
           </p:nvPr>
         </p:nvSpPr>
         <p:spPr>
@@ -2309,11 +2376,11 @@
           </a:prstGeom>
         </p:spPr>
         <p:txBody>
-          <a:bodyPr anchorCtr="0" anchor="t" bIns="91425" lIns="91425" spcFirstLastPara="1" rIns="91425" wrap="square" tIns="91425">
+          <a:bodyPr spcFirstLastPara="1" wrap="square" lIns="91425" tIns="91425" rIns="91425" bIns="91425" anchor="t" anchorCtr="0">
             <a:normAutofit/>
           </a:bodyPr>
           <a:lstStyle>
-            <a:lvl1pPr indent="-342900" lvl="0" marL="457200">
+            <a:lvl1pPr marL="457200" lvl="0" indent="-342900">
               <a:spcBef>
                 <a:spcPts val="0"/>
               </a:spcBef>
@@ -2324,7 +2391,7 @@
               <a:buChar char="●"/>
               <a:defRPr/>
             </a:lvl1pPr>
-            <a:lvl2pPr indent="-317500" lvl="1" marL="914400">
+            <a:lvl2pPr marL="914400" lvl="1" indent="-317500">
               <a:spcBef>
                 <a:spcPts val="0"/>
               </a:spcBef>
@@ -2335,7 +2402,7 @@
               <a:buChar char="○"/>
               <a:defRPr/>
             </a:lvl2pPr>
-            <a:lvl3pPr indent="-317500" lvl="2" marL="1371600">
+            <a:lvl3pPr marL="1371600" lvl="2" indent="-317500">
               <a:spcBef>
                 <a:spcPts val="0"/>
               </a:spcBef>
@@ -2346,7 +2413,7 @@
               <a:buChar char="■"/>
               <a:defRPr/>
             </a:lvl3pPr>
-            <a:lvl4pPr indent="-317500" lvl="3" marL="1828800">
+            <a:lvl4pPr marL="1828800" lvl="3" indent="-317500">
               <a:spcBef>
                 <a:spcPts val="0"/>
               </a:spcBef>
@@ -2357,7 +2424,7 @@
               <a:buChar char="●"/>
               <a:defRPr/>
             </a:lvl4pPr>
-            <a:lvl5pPr indent="-317500" lvl="4" marL="2286000">
+            <a:lvl5pPr marL="2286000" lvl="4" indent="-317500">
               <a:spcBef>
                 <a:spcPts val="0"/>
               </a:spcBef>
@@ -2368,7 +2435,7 @@
               <a:buChar char="○"/>
               <a:defRPr/>
             </a:lvl5pPr>
-            <a:lvl6pPr indent="-317500" lvl="5" marL="2743200">
+            <a:lvl6pPr marL="2743200" lvl="5" indent="-317500">
               <a:spcBef>
                 <a:spcPts val="0"/>
               </a:spcBef>
@@ -2379,7 +2446,7 @@
               <a:buChar char="■"/>
               <a:defRPr/>
             </a:lvl6pPr>
-            <a:lvl7pPr indent="-317500" lvl="6" marL="3200400">
+            <a:lvl7pPr marL="3200400" lvl="6" indent="-317500">
               <a:spcBef>
                 <a:spcPts val="0"/>
               </a:spcBef>
@@ -2390,7 +2457,7 @@
               <a:buChar char="●"/>
               <a:defRPr/>
             </a:lvl7pPr>
-            <a:lvl8pPr indent="-317500" lvl="7" marL="3657600">
+            <a:lvl8pPr marL="3657600" lvl="7" indent="-317500">
               <a:spcBef>
                 <a:spcPts val="0"/>
               </a:spcBef>
@@ -2401,7 +2468,7 @@
               <a:buChar char="○"/>
               <a:defRPr/>
             </a:lvl8pPr>
-            <a:lvl9pPr indent="-317500" lvl="8" marL="4114800">
+            <a:lvl9pPr marL="4114800" lvl="8" indent="-317500">
               <a:spcBef>
                 <a:spcPts val="0"/>
               </a:spcBef>
@@ -2413,15 +2480,19 @@
               <a:defRPr/>
             </a:lvl9pPr>
           </a:lstStyle>
-          <a:p/>
+          <a:p>
+            <a:endParaRPr/>
+          </a:p>
         </p:txBody>
       </p:sp>
       <p:sp>
         <p:nvSpPr>
           <p:cNvPr id="19" name="Google Shape;19;p4"/>
-          <p:cNvSpPr txBox="1"/>
+          <p:cNvSpPr txBox="1">
+            <a:spLocks noGrp="1"/>
+          </p:cNvSpPr>
           <p:nvPr>
-            <p:ph idx="12" type="sldNum"/>
+            <p:ph type="sldNum" idx="12"/>
           </p:nvPr>
         </p:nvSpPr>
         <p:spPr>
@@ -2434,7 +2505,7 @@
           </a:prstGeom>
         </p:spPr>
         <p:txBody>
-          <a:bodyPr anchorCtr="0" anchor="ctr" bIns="91425" lIns="91425" spcFirstLastPara="1" rIns="91425" wrap="square" tIns="91425">
+          <a:bodyPr spcFirstLastPara="1" wrap="square" lIns="91425" tIns="91425" rIns="91425" bIns="91425" anchor="ctr" anchorCtr="0">
             <a:normAutofit/>
           </a:bodyPr>
           <a:lstStyle>
@@ -2476,7 +2547,7 @@
             </a:lvl9pPr>
           </a:lstStyle>
           <a:p>
-            <a:pPr indent="0" lvl="0" marL="0" rtl="0" algn="r">
+            <a:pPr marL="0" lvl="0" indent="0" algn="r" rtl="0">
               <a:spcBef>
                 <a:spcPts val="0"/>
               </a:spcBef>
@@ -2502,11 +2573,11 @@
 </file>
 
 <file path=ppt/slideLayouts/slideLayout4.xml><?xml version="1.0" encoding="utf-8"?>
-<p:sldLayout xmlns:a="http://schemas.openxmlformats.org/drawingml/2006/main" xmlns:r="http://schemas.openxmlformats.org/officeDocument/2006/relationships" xmlns:mc="http://schemas.openxmlformats.org/markup-compatibility/2006" xmlns:mv="urn:schemas-microsoft-com:mac:vml" xmlns:p="http://schemas.openxmlformats.org/presentationml/2006/main" xmlns:c="http://schemas.openxmlformats.org/drawingml/2006/chart" xmlns:dgm="http://schemas.openxmlformats.org/drawingml/2006/diagram" xmlns:o="urn:schemas-microsoft-com:office:office" xmlns:v="urn:schemas-microsoft-com:vml" xmlns:pvml="urn:schemas-microsoft-com:office:powerpoint" xmlns:com="http://schemas.openxmlformats.org/drawingml/2006/compatibility" xmlns:p14="http://schemas.microsoft.com/office/powerpoint/2010/main" xmlns:p15="http://schemas.microsoft.com/office/powerpoint/2012/main" xmlns:ahyp="http://schemas.microsoft.com/office/drawing/2018/hyperlinkcolor" matchingName="Title and two columns" type="twoColTx">
+<p:sldLayout xmlns:a="http://schemas.openxmlformats.org/drawingml/2006/main" xmlns:r="http://schemas.openxmlformats.org/officeDocument/2006/relationships" xmlns:p="http://schemas.openxmlformats.org/presentationml/2006/main" matchingName="Title and two columns" type="twoColTx">
   <p:cSld name="TITLE_AND_TWO_COLUMNS">
     <p:spTree>
       <p:nvGrpSpPr>
-        <p:cNvPr id="20" name="Shape 20"/>
+        <p:cNvPr id="1" name="Shape 20"/>
         <p:cNvGrpSpPr/>
         <p:nvPr/>
       </p:nvGrpSpPr>
@@ -2521,7 +2592,9 @@
       <p:sp>
         <p:nvSpPr>
           <p:cNvPr id="21" name="Google Shape;21;p5"/>
-          <p:cNvSpPr txBox="1"/>
+          <p:cNvSpPr txBox="1">
+            <a:spLocks noGrp="1"/>
+          </p:cNvSpPr>
           <p:nvPr>
             <p:ph type="title"/>
           </p:nvPr>
@@ -2536,7 +2609,7 @@
           </a:prstGeom>
         </p:spPr>
         <p:txBody>
-          <a:bodyPr anchorCtr="0" anchor="t" bIns="91425" lIns="91425" spcFirstLastPara="1" rIns="91425" wrap="square" tIns="91425">
+          <a:bodyPr spcFirstLastPara="1" wrap="square" lIns="91425" tIns="91425" rIns="91425" bIns="91425" anchor="t" anchorCtr="0">
             <a:normAutofit/>
           </a:bodyPr>
           <a:lstStyle>
@@ -2640,15 +2713,19 @@
               <a:defRPr/>
             </a:lvl9pPr>
           </a:lstStyle>
-          <a:p/>
+          <a:p>
+            <a:endParaRPr/>
+          </a:p>
         </p:txBody>
       </p:sp>
       <p:sp>
         <p:nvSpPr>
           <p:cNvPr id="22" name="Google Shape;22;p5"/>
-          <p:cNvSpPr txBox="1"/>
+          <p:cNvSpPr txBox="1">
+            <a:spLocks noGrp="1"/>
+          </p:cNvSpPr>
           <p:nvPr>
-            <p:ph idx="1" type="body"/>
+            <p:ph type="body" idx="1"/>
           </p:nvPr>
         </p:nvSpPr>
         <p:spPr>
@@ -2661,11 +2738,11 @@
           </a:prstGeom>
         </p:spPr>
         <p:txBody>
-          <a:bodyPr anchorCtr="0" anchor="t" bIns="91425" lIns="91425" spcFirstLastPara="1" rIns="91425" wrap="square" tIns="91425">
+          <a:bodyPr spcFirstLastPara="1" wrap="square" lIns="91425" tIns="91425" rIns="91425" bIns="91425" anchor="t" anchorCtr="0">
             <a:normAutofit/>
           </a:bodyPr>
           <a:lstStyle>
-            <a:lvl1pPr indent="-317500" lvl="0" marL="457200">
+            <a:lvl1pPr marL="457200" lvl="0" indent="-317500">
               <a:spcBef>
                 <a:spcPts val="0"/>
               </a:spcBef>
@@ -2676,7 +2753,7 @@
               <a:buChar char="●"/>
               <a:defRPr sz="1400"/>
             </a:lvl1pPr>
-            <a:lvl2pPr indent="-304800" lvl="1" marL="914400">
+            <a:lvl2pPr marL="914400" lvl="1" indent="-304800">
               <a:spcBef>
                 <a:spcPts val="0"/>
               </a:spcBef>
@@ -2687,7 +2764,7 @@
               <a:buChar char="○"/>
               <a:defRPr sz="1200"/>
             </a:lvl2pPr>
-            <a:lvl3pPr indent="-304800" lvl="2" marL="1371600">
+            <a:lvl3pPr marL="1371600" lvl="2" indent="-304800">
               <a:spcBef>
                 <a:spcPts val="0"/>
               </a:spcBef>
@@ -2698,7 +2775,7 @@
               <a:buChar char="■"/>
               <a:defRPr sz="1200"/>
             </a:lvl3pPr>
-            <a:lvl4pPr indent="-304800" lvl="3" marL="1828800">
+            <a:lvl4pPr marL="1828800" lvl="3" indent="-304800">
               <a:spcBef>
                 <a:spcPts val="0"/>
               </a:spcBef>
@@ -2709,7 +2786,7 @@
               <a:buChar char="●"/>
               <a:defRPr sz="1200"/>
             </a:lvl4pPr>
-            <a:lvl5pPr indent="-304800" lvl="4" marL="2286000">
+            <a:lvl5pPr marL="2286000" lvl="4" indent="-304800">
               <a:spcBef>
                 <a:spcPts val="0"/>
               </a:spcBef>
@@ -2720,7 +2797,7 @@
               <a:buChar char="○"/>
               <a:defRPr sz="1200"/>
             </a:lvl5pPr>
-            <a:lvl6pPr indent="-304800" lvl="5" marL="2743200">
+            <a:lvl6pPr marL="2743200" lvl="5" indent="-304800">
               <a:spcBef>
                 <a:spcPts val="0"/>
               </a:spcBef>
@@ -2731,7 +2808,7 @@
               <a:buChar char="■"/>
               <a:defRPr sz="1200"/>
             </a:lvl6pPr>
-            <a:lvl7pPr indent="-304800" lvl="6" marL="3200400">
+            <a:lvl7pPr marL="3200400" lvl="6" indent="-304800">
               <a:spcBef>
                 <a:spcPts val="0"/>
               </a:spcBef>
@@ -2742,7 +2819,7 @@
               <a:buChar char="●"/>
               <a:defRPr sz="1200"/>
             </a:lvl7pPr>
-            <a:lvl8pPr indent="-304800" lvl="7" marL="3657600">
+            <a:lvl8pPr marL="3657600" lvl="7" indent="-304800">
               <a:spcBef>
                 <a:spcPts val="0"/>
               </a:spcBef>
@@ -2753,7 +2830,7 @@
               <a:buChar char="○"/>
               <a:defRPr sz="1200"/>
             </a:lvl8pPr>
-            <a:lvl9pPr indent="-304800" lvl="8" marL="4114800">
+            <a:lvl9pPr marL="4114800" lvl="8" indent="-304800">
               <a:spcBef>
                 <a:spcPts val="0"/>
               </a:spcBef>
@@ -2765,15 +2842,19 @@
               <a:defRPr sz="1200"/>
             </a:lvl9pPr>
           </a:lstStyle>
-          <a:p/>
+          <a:p>
+            <a:endParaRPr/>
+          </a:p>
         </p:txBody>
       </p:sp>
       <p:sp>
         <p:nvSpPr>
           <p:cNvPr id="23" name="Google Shape;23;p5"/>
-          <p:cNvSpPr txBox="1"/>
+          <p:cNvSpPr txBox="1">
+            <a:spLocks noGrp="1"/>
+          </p:cNvSpPr>
           <p:nvPr>
-            <p:ph idx="2" type="body"/>
+            <p:ph type="body" idx="2"/>
           </p:nvPr>
         </p:nvSpPr>
         <p:spPr>
@@ -2786,11 +2867,11 @@
           </a:prstGeom>
         </p:spPr>
         <p:txBody>
-          <a:bodyPr anchorCtr="0" anchor="t" bIns="91425" lIns="91425" spcFirstLastPara="1" rIns="91425" wrap="square" tIns="91425">
+          <a:bodyPr spcFirstLastPara="1" wrap="square" lIns="91425" tIns="91425" rIns="91425" bIns="91425" anchor="t" anchorCtr="0">
             <a:normAutofit/>
           </a:bodyPr>
           <a:lstStyle>
-            <a:lvl1pPr indent="-317500" lvl="0" marL="457200">
+            <a:lvl1pPr marL="457200" lvl="0" indent="-317500">
               <a:spcBef>
                 <a:spcPts val="0"/>
               </a:spcBef>
@@ -2801,7 +2882,7 @@
               <a:buChar char="●"/>
               <a:defRPr sz="1400"/>
             </a:lvl1pPr>
-            <a:lvl2pPr indent="-304800" lvl="1" marL="914400">
+            <a:lvl2pPr marL="914400" lvl="1" indent="-304800">
               <a:spcBef>
                 <a:spcPts val="0"/>
               </a:spcBef>
@@ -2812,7 +2893,7 @@
               <a:buChar char="○"/>
               <a:defRPr sz="1200"/>
             </a:lvl2pPr>
-            <a:lvl3pPr indent="-304800" lvl="2" marL="1371600">
+            <a:lvl3pPr marL="1371600" lvl="2" indent="-304800">
               <a:spcBef>
                 <a:spcPts val="0"/>
               </a:spcBef>
@@ -2823,7 +2904,7 @@
               <a:buChar char="■"/>
               <a:defRPr sz="1200"/>
             </a:lvl3pPr>
-            <a:lvl4pPr indent="-304800" lvl="3" marL="1828800">
+            <a:lvl4pPr marL="1828800" lvl="3" indent="-304800">
               <a:spcBef>
                 <a:spcPts val="0"/>
               </a:spcBef>
@@ -2834,7 +2915,7 @@
               <a:buChar char="●"/>
               <a:defRPr sz="1200"/>
             </a:lvl4pPr>
-            <a:lvl5pPr indent="-304800" lvl="4" marL="2286000">
+            <a:lvl5pPr marL="2286000" lvl="4" indent="-304800">
               <a:spcBef>
                 <a:spcPts val="0"/>
               </a:spcBef>
@@ -2845,7 +2926,7 @@
               <a:buChar char="○"/>
               <a:defRPr sz="1200"/>
             </a:lvl5pPr>
-            <a:lvl6pPr indent="-304800" lvl="5" marL="2743200">
+            <a:lvl6pPr marL="2743200" lvl="5" indent="-304800">
               <a:spcBef>
                 <a:spcPts val="0"/>
               </a:spcBef>
@@ -2856,7 +2937,7 @@
               <a:buChar char="■"/>
               <a:defRPr sz="1200"/>
             </a:lvl6pPr>
-            <a:lvl7pPr indent="-304800" lvl="6" marL="3200400">
+            <a:lvl7pPr marL="3200400" lvl="6" indent="-304800">
               <a:spcBef>
                 <a:spcPts val="0"/>
               </a:spcBef>
@@ -2867,7 +2948,7 @@
               <a:buChar char="●"/>
               <a:defRPr sz="1200"/>
             </a:lvl7pPr>
-            <a:lvl8pPr indent="-304800" lvl="7" marL="3657600">
+            <a:lvl8pPr marL="3657600" lvl="7" indent="-304800">
               <a:spcBef>
                 <a:spcPts val="0"/>
               </a:spcBef>
@@ -2878,7 +2959,7 @@
               <a:buChar char="○"/>
               <a:defRPr sz="1200"/>
             </a:lvl8pPr>
-            <a:lvl9pPr indent="-304800" lvl="8" marL="4114800">
+            <a:lvl9pPr marL="4114800" lvl="8" indent="-304800">
               <a:spcBef>
                 <a:spcPts val="0"/>
               </a:spcBef>
@@ -2890,15 +2971,19 @@
               <a:defRPr sz="1200"/>
             </a:lvl9pPr>
           </a:lstStyle>
-          <a:p/>
+          <a:p>
+            <a:endParaRPr/>
+          </a:p>
         </p:txBody>
       </p:sp>
       <p:sp>
         <p:nvSpPr>
           <p:cNvPr id="24" name="Google Shape;24;p5"/>
-          <p:cNvSpPr txBox="1"/>
+          <p:cNvSpPr txBox="1">
+            <a:spLocks noGrp="1"/>
+          </p:cNvSpPr>
           <p:nvPr>
-            <p:ph idx="12" type="sldNum"/>
+            <p:ph type="sldNum" idx="12"/>
           </p:nvPr>
         </p:nvSpPr>
         <p:spPr>
@@ -2911,7 +2996,7 @@
           </a:prstGeom>
         </p:spPr>
         <p:txBody>
-          <a:bodyPr anchorCtr="0" anchor="ctr" bIns="91425" lIns="91425" spcFirstLastPara="1" rIns="91425" wrap="square" tIns="91425">
+          <a:bodyPr spcFirstLastPara="1" wrap="square" lIns="91425" tIns="91425" rIns="91425" bIns="91425" anchor="ctr" anchorCtr="0">
             <a:normAutofit/>
           </a:bodyPr>
           <a:lstStyle>
@@ -2953,7 +3038,7 @@
             </a:lvl9pPr>
           </a:lstStyle>
           <a:p>
-            <a:pPr indent="0" lvl="0" marL="0" rtl="0" algn="r">
+            <a:pPr marL="0" lvl="0" indent="0" algn="r" rtl="0">
               <a:spcBef>
                 <a:spcPts val="0"/>
               </a:spcBef>
@@ -2979,11 +3064,11 @@
 </file>
 
 <file path=ppt/slideLayouts/slideLayout5.xml><?xml version="1.0" encoding="utf-8"?>
-<p:sldLayout xmlns:a="http://schemas.openxmlformats.org/drawingml/2006/main" xmlns:r="http://schemas.openxmlformats.org/officeDocument/2006/relationships" xmlns:mc="http://schemas.openxmlformats.org/markup-compatibility/2006" xmlns:mv="urn:schemas-microsoft-com:mac:vml" xmlns:p="http://schemas.openxmlformats.org/presentationml/2006/main" xmlns:c="http://schemas.openxmlformats.org/drawingml/2006/chart" xmlns:dgm="http://schemas.openxmlformats.org/drawingml/2006/diagram" xmlns:o="urn:schemas-microsoft-com:office:office" xmlns:v="urn:schemas-microsoft-com:vml" xmlns:pvml="urn:schemas-microsoft-com:office:powerpoint" xmlns:com="http://schemas.openxmlformats.org/drawingml/2006/compatibility" xmlns:p14="http://schemas.microsoft.com/office/powerpoint/2010/main" xmlns:p15="http://schemas.microsoft.com/office/powerpoint/2012/main" xmlns:ahyp="http://schemas.microsoft.com/office/drawing/2018/hyperlinkcolor" matchingName="Title only" type="titleOnly">
+<p:sldLayout xmlns:a="http://schemas.openxmlformats.org/drawingml/2006/main" xmlns:r="http://schemas.openxmlformats.org/officeDocument/2006/relationships" xmlns:p="http://schemas.openxmlformats.org/presentationml/2006/main" matchingName="Title only" type="titleOnly">
   <p:cSld name="TITLE_ONLY">
     <p:spTree>
       <p:nvGrpSpPr>
-        <p:cNvPr id="25" name="Shape 25"/>
+        <p:cNvPr id="1" name="Shape 25"/>
         <p:cNvGrpSpPr/>
         <p:nvPr/>
       </p:nvGrpSpPr>
@@ -2998,7 +3083,9 @@
       <p:sp>
         <p:nvSpPr>
           <p:cNvPr id="26" name="Google Shape;26;p6"/>
-          <p:cNvSpPr txBox="1"/>
+          <p:cNvSpPr txBox="1">
+            <a:spLocks noGrp="1"/>
+          </p:cNvSpPr>
           <p:nvPr>
             <p:ph type="title"/>
           </p:nvPr>
@@ -3013,7 +3100,7 @@
           </a:prstGeom>
         </p:spPr>
         <p:txBody>
-          <a:bodyPr anchorCtr="0" anchor="t" bIns="91425" lIns="91425" spcFirstLastPara="1" rIns="91425" wrap="square" tIns="91425">
+          <a:bodyPr spcFirstLastPara="1" wrap="square" lIns="91425" tIns="91425" rIns="91425" bIns="91425" anchor="t" anchorCtr="0">
             <a:normAutofit/>
           </a:bodyPr>
           <a:lstStyle>
@@ -3117,15 +3204,19 @@
               <a:defRPr/>
             </a:lvl9pPr>
           </a:lstStyle>
-          <a:p/>
+          <a:p>
+            <a:endParaRPr/>
+          </a:p>
         </p:txBody>
       </p:sp>
       <p:sp>
         <p:nvSpPr>
           <p:cNvPr id="27" name="Google Shape;27;p6"/>
-          <p:cNvSpPr txBox="1"/>
+          <p:cNvSpPr txBox="1">
+            <a:spLocks noGrp="1"/>
+          </p:cNvSpPr>
           <p:nvPr>
-            <p:ph idx="12" type="sldNum"/>
+            <p:ph type="sldNum" idx="12"/>
           </p:nvPr>
         </p:nvSpPr>
         <p:spPr>
@@ -3138,7 +3229,7 @@
           </a:prstGeom>
         </p:spPr>
         <p:txBody>
-          <a:bodyPr anchorCtr="0" anchor="ctr" bIns="91425" lIns="91425" spcFirstLastPara="1" rIns="91425" wrap="square" tIns="91425">
+          <a:bodyPr spcFirstLastPara="1" wrap="square" lIns="91425" tIns="91425" rIns="91425" bIns="91425" anchor="ctr" anchorCtr="0">
             <a:normAutofit/>
           </a:bodyPr>
           <a:lstStyle>
@@ -3180,7 +3271,7 @@
             </a:lvl9pPr>
           </a:lstStyle>
           <a:p>
-            <a:pPr indent="0" lvl="0" marL="0" rtl="0" algn="r">
+            <a:pPr marL="0" lvl="0" indent="0" algn="r" rtl="0">
               <a:spcBef>
                 <a:spcPts val="0"/>
               </a:spcBef>
@@ -3206,11 +3297,11 @@
 </file>
 
 <file path=ppt/slideLayouts/slideLayout6.xml><?xml version="1.0" encoding="utf-8"?>
-<p:sldLayout xmlns:a="http://schemas.openxmlformats.org/drawingml/2006/main" xmlns:r="http://schemas.openxmlformats.org/officeDocument/2006/relationships" xmlns:mc="http://schemas.openxmlformats.org/markup-compatibility/2006" xmlns:mv="urn:schemas-microsoft-com:mac:vml" xmlns:p="http://schemas.openxmlformats.org/presentationml/2006/main" xmlns:c="http://schemas.openxmlformats.org/drawingml/2006/chart" xmlns:dgm="http://schemas.openxmlformats.org/drawingml/2006/diagram" xmlns:o="urn:schemas-microsoft-com:office:office" xmlns:v="urn:schemas-microsoft-com:vml" xmlns:pvml="urn:schemas-microsoft-com:office:powerpoint" xmlns:com="http://schemas.openxmlformats.org/drawingml/2006/compatibility" xmlns:p14="http://schemas.microsoft.com/office/powerpoint/2010/main" xmlns:p15="http://schemas.microsoft.com/office/powerpoint/2012/main" xmlns:ahyp="http://schemas.microsoft.com/office/drawing/2018/hyperlinkcolor" matchingName="One column text">
+<p:sldLayout xmlns:a="http://schemas.openxmlformats.org/drawingml/2006/main" xmlns:r="http://schemas.openxmlformats.org/officeDocument/2006/relationships" xmlns:p="http://schemas.openxmlformats.org/presentationml/2006/main" matchingName="One column text">
   <p:cSld name="ONE_COLUMN_TEXT">
     <p:spTree>
       <p:nvGrpSpPr>
-        <p:cNvPr id="28" name="Shape 28"/>
+        <p:cNvPr id="1" name="Shape 28"/>
         <p:cNvGrpSpPr/>
         <p:nvPr/>
       </p:nvGrpSpPr>
@@ -3225,7 +3316,9 @@
       <p:sp>
         <p:nvSpPr>
           <p:cNvPr id="29" name="Google Shape;29;p7"/>
-          <p:cNvSpPr txBox="1"/>
+          <p:cNvSpPr txBox="1">
+            <a:spLocks noGrp="1"/>
+          </p:cNvSpPr>
           <p:nvPr>
             <p:ph type="title"/>
           </p:nvPr>
@@ -3240,7 +3333,7 @@
           </a:prstGeom>
         </p:spPr>
         <p:txBody>
-          <a:bodyPr anchorCtr="0" anchor="b" bIns="91425" lIns="91425" spcFirstLastPara="1" rIns="91425" wrap="square" tIns="91425">
+          <a:bodyPr spcFirstLastPara="1" wrap="square" lIns="91425" tIns="91425" rIns="91425" bIns="91425" anchor="b" anchorCtr="0">
             <a:normAutofit/>
           </a:bodyPr>
           <a:lstStyle>
@@ -3344,15 +3437,19 @@
               <a:defRPr sz="2400"/>
             </a:lvl9pPr>
           </a:lstStyle>
-          <a:p/>
+          <a:p>
+            <a:endParaRPr/>
+          </a:p>
         </p:txBody>
       </p:sp>
       <p:sp>
         <p:nvSpPr>
           <p:cNvPr id="30" name="Google Shape;30;p7"/>
-          <p:cNvSpPr txBox="1"/>
+          <p:cNvSpPr txBox="1">
+            <a:spLocks noGrp="1"/>
+          </p:cNvSpPr>
           <p:nvPr>
-            <p:ph idx="1" type="body"/>
+            <p:ph type="body" idx="1"/>
           </p:nvPr>
         </p:nvSpPr>
         <p:spPr>
@@ -3365,11 +3462,11 @@
           </a:prstGeom>
         </p:spPr>
         <p:txBody>
-          <a:bodyPr anchorCtr="0" anchor="t" bIns="91425" lIns="91425" spcFirstLastPara="1" rIns="91425" wrap="square" tIns="91425">
+          <a:bodyPr spcFirstLastPara="1" wrap="square" lIns="91425" tIns="91425" rIns="91425" bIns="91425" anchor="t" anchorCtr="0">
             <a:normAutofit/>
           </a:bodyPr>
           <a:lstStyle>
-            <a:lvl1pPr indent="-304800" lvl="0" marL="457200">
+            <a:lvl1pPr marL="457200" lvl="0" indent="-304800">
               <a:spcBef>
                 <a:spcPts val="0"/>
               </a:spcBef>
@@ -3380,7 +3477,7 @@
               <a:buChar char="●"/>
               <a:defRPr sz="1200"/>
             </a:lvl1pPr>
-            <a:lvl2pPr indent="-304800" lvl="1" marL="914400">
+            <a:lvl2pPr marL="914400" lvl="1" indent="-304800">
               <a:spcBef>
                 <a:spcPts val="0"/>
               </a:spcBef>
@@ -3391,7 +3488,7 @@
               <a:buChar char="○"/>
               <a:defRPr sz="1200"/>
             </a:lvl2pPr>
-            <a:lvl3pPr indent="-304800" lvl="2" marL="1371600">
+            <a:lvl3pPr marL="1371600" lvl="2" indent="-304800">
               <a:spcBef>
                 <a:spcPts val="0"/>
               </a:spcBef>
@@ -3402,7 +3499,7 @@
               <a:buChar char="■"/>
               <a:defRPr sz="1200"/>
             </a:lvl3pPr>
-            <a:lvl4pPr indent="-304800" lvl="3" marL="1828800">
+            <a:lvl4pPr marL="1828800" lvl="3" indent="-304800">
               <a:spcBef>
                 <a:spcPts val="0"/>
               </a:spcBef>
@@ -3413,7 +3510,7 @@
               <a:buChar char="●"/>
               <a:defRPr sz="1200"/>
             </a:lvl4pPr>
-            <a:lvl5pPr indent="-304800" lvl="4" marL="2286000">
+            <a:lvl5pPr marL="2286000" lvl="4" indent="-304800">
               <a:spcBef>
                 <a:spcPts val="0"/>
               </a:spcBef>
@@ -3424,7 +3521,7 @@
               <a:buChar char="○"/>
               <a:defRPr sz="1200"/>
             </a:lvl5pPr>
-            <a:lvl6pPr indent="-304800" lvl="5" marL="2743200">
+            <a:lvl6pPr marL="2743200" lvl="5" indent="-304800">
               <a:spcBef>
                 <a:spcPts val="0"/>
               </a:spcBef>
@@ -3435,7 +3532,7 @@
               <a:buChar char="■"/>
               <a:defRPr sz="1200"/>
             </a:lvl6pPr>
-            <a:lvl7pPr indent="-304800" lvl="6" marL="3200400">
+            <a:lvl7pPr marL="3200400" lvl="6" indent="-304800">
               <a:spcBef>
                 <a:spcPts val="0"/>
               </a:spcBef>
@@ -3446,7 +3543,7 @@
               <a:buChar char="●"/>
               <a:defRPr sz="1200"/>
             </a:lvl7pPr>
-            <a:lvl8pPr indent="-304800" lvl="7" marL="3657600">
+            <a:lvl8pPr marL="3657600" lvl="7" indent="-304800">
               <a:spcBef>
                 <a:spcPts val="0"/>
               </a:spcBef>
@@ -3457,7 +3554,7 @@
               <a:buChar char="○"/>
               <a:defRPr sz="1200"/>
             </a:lvl8pPr>
-            <a:lvl9pPr indent="-304800" lvl="8" marL="4114800">
+            <a:lvl9pPr marL="4114800" lvl="8" indent="-304800">
               <a:spcBef>
                 <a:spcPts val="0"/>
               </a:spcBef>
@@ -3469,15 +3566,19 @@
               <a:defRPr sz="1200"/>
             </a:lvl9pPr>
           </a:lstStyle>
-          <a:p/>
+          <a:p>
+            <a:endParaRPr/>
+          </a:p>
         </p:txBody>
       </p:sp>
       <p:sp>
         <p:nvSpPr>
           <p:cNvPr id="31" name="Google Shape;31;p7"/>
-          <p:cNvSpPr txBox="1"/>
+          <p:cNvSpPr txBox="1">
+            <a:spLocks noGrp="1"/>
+          </p:cNvSpPr>
           <p:nvPr>
-            <p:ph idx="12" type="sldNum"/>
+            <p:ph type="sldNum" idx="12"/>
           </p:nvPr>
         </p:nvSpPr>
         <p:spPr>
@@ -3490,7 +3591,7 @@
           </a:prstGeom>
         </p:spPr>
         <p:txBody>
-          <a:bodyPr anchorCtr="0" anchor="ctr" bIns="91425" lIns="91425" spcFirstLastPara="1" rIns="91425" wrap="square" tIns="91425">
+          <a:bodyPr spcFirstLastPara="1" wrap="square" lIns="91425" tIns="91425" rIns="91425" bIns="91425" anchor="ctr" anchorCtr="0">
             <a:normAutofit/>
           </a:bodyPr>
           <a:lstStyle>
@@ -3532,7 +3633,7 @@
             </a:lvl9pPr>
           </a:lstStyle>
           <a:p>
-            <a:pPr indent="0" lvl="0" marL="0" rtl="0" algn="r">
+            <a:pPr marL="0" lvl="0" indent="0" algn="r" rtl="0">
               <a:spcBef>
                 <a:spcPts val="0"/>
               </a:spcBef>
@@ -3558,11 +3659,11 @@
 </file>
 
 <file path=ppt/slideLayouts/slideLayout7.xml><?xml version="1.0" encoding="utf-8"?>
-<p:sldLayout xmlns:a="http://schemas.openxmlformats.org/drawingml/2006/main" xmlns:r="http://schemas.openxmlformats.org/officeDocument/2006/relationships" xmlns:mc="http://schemas.openxmlformats.org/markup-compatibility/2006" xmlns:mv="urn:schemas-microsoft-com:mac:vml" xmlns:p="http://schemas.openxmlformats.org/presentationml/2006/main" xmlns:c="http://schemas.openxmlformats.org/drawingml/2006/chart" xmlns:dgm="http://schemas.openxmlformats.org/drawingml/2006/diagram" xmlns:o="urn:schemas-microsoft-com:office:office" xmlns:v="urn:schemas-microsoft-com:vml" xmlns:pvml="urn:schemas-microsoft-com:office:powerpoint" xmlns:com="http://schemas.openxmlformats.org/drawingml/2006/compatibility" xmlns:p14="http://schemas.microsoft.com/office/powerpoint/2010/main" xmlns:p15="http://schemas.microsoft.com/office/powerpoint/2012/main" xmlns:ahyp="http://schemas.microsoft.com/office/drawing/2018/hyperlinkcolor" matchingName="Main point">
+<p:sldLayout xmlns:a="http://schemas.openxmlformats.org/drawingml/2006/main" xmlns:r="http://schemas.openxmlformats.org/officeDocument/2006/relationships" xmlns:p="http://schemas.openxmlformats.org/presentationml/2006/main" matchingName="Main point">
   <p:cSld name="MAIN_POINT">
     <p:spTree>
       <p:nvGrpSpPr>
-        <p:cNvPr id="32" name="Shape 32"/>
+        <p:cNvPr id="1" name="Shape 32"/>
         <p:cNvGrpSpPr/>
         <p:nvPr/>
       </p:nvGrpSpPr>
@@ -3577,7 +3678,9 @@
       <p:sp>
         <p:nvSpPr>
           <p:cNvPr id="33" name="Google Shape;33;p8"/>
-          <p:cNvSpPr txBox="1"/>
+          <p:cNvSpPr txBox="1">
+            <a:spLocks noGrp="1"/>
+          </p:cNvSpPr>
           <p:nvPr>
             <p:ph type="title"/>
           </p:nvPr>
@@ -3592,7 +3695,7 @@
           </a:prstGeom>
         </p:spPr>
         <p:txBody>
-          <a:bodyPr anchorCtr="0" anchor="ctr" bIns="91425" lIns="91425" spcFirstLastPara="1" rIns="91425" wrap="square" tIns="91425">
+          <a:bodyPr spcFirstLastPara="1" wrap="square" lIns="91425" tIns="91425" rIns="91425" bIns="91425" anchor="ctr" anchorCtr="0">
             <a:normAutofit/>
           </a:bodyPr>
           <a:lstStyle>
@@ -3696,15 +3799,19 @@
               <a:defRPr sz="4800"/>
             </a:lvl9pPr>
           </a:lstStyle>
-          <a:p/>
+          <a:p>
+            <a:endParaRPr/>
+          </a:p>
         </p:txBody>
       </p:sp>
       <p:sp>
         <p:nvSpPr>
           <p:cNvPr id="34" name="Google Shape;34;p8"/>
-          <p:cNvSpPr txBox="1"/>
+          <p:cNvSpPr txBox="1">
+            <a:spLocks noGrp="1"/>
+          </p:cNvSpPr>
           <p:nvPr>
-            <p:ph idx="12" type="sldNum"/>
+            <p:ph type="sldNum" idx="12"/>
           </p:nvPr>
         </p:nvSpPr>
         <p:spPr>
@@ -3717,7 +3824,7 @@
           </a:prstGeom>
         </p:spPr>
         <p:txBody>
-          <a:bodyPr anchorCtr="0" anchor="ctr" bIns="91425" lIns="91425" spcFirstLastPara="1" rIns="91425" wrap="square" tIns="91425">
+          <a:bodyPr spcFirstLastPara="1" wrap="square" lIns="91425" tIns="91425" rIns="91425" bIns="91425" anchor="ctr" anchorCtr="0">
             <a:normAutofit/>
           </a:bodyPr>
           <a:lstStyle>
@@ -3759,7 +3866,7 @@
             </a:lvl9pPr>
           </a:lstStyle>
           <a:p>
-            <a:pPr indent="0" lvl="0" marL="0" rtl="0" algn="r">
+            <a:pPr marL="0" lvl="0" indent="0" algn="r" rtl="0">
               <a:spcBef>
                 <a:spcPts val="0"/>
               </a:spcBef>
@@ -3785,11 +3892,11 @@
 </file>
 
 <file path=ppt/slideLayouts/slideLayout8.xml><?xml version="1.0" encoding="utf-8"?>
-<p:sldLayout xmlns:a="http://schemas.openxmlformats.org/drawingml/2006/main" xmlns:r="http://schemas.openxmlformats.org/officeDocument/2006/relationships" xmlns:mc="http://schemas.openxmlformats.org/markup-compatibility/2006" xmlns:mv="urn:schemas-microsoft-com:mac:vml" xmlns:p="http://schemas.openxmlformats.org/presentationml/2006/main" xmlns:c="http://schemas.openxmlformats.org/drawingml/2006/chart" xmlns:dgm="http://schemas.openxmlformats.org/drawingml/2006/diagram" xmlns:o="urn:schemas-microsoft-com:office:office" xmlns:v="urn:schemas-microsoft-com:vml" xmlns:pvml="urn:schemas-microsoft-com:office:powerpoint" xmlns:com="http://schemas.openxmlformats.org/drawingml/2006/compatibility" xmlns:p14="http://schemas.microsoft.com/office/powerpoint/2010/main" xmlns:p15="http://schemas.microsoft.com/office/powerpoint/2012/main" xmlns:ahyp="http://schemas.microsoft.com/office/drawing/2018/hyperlinkcolor" matchingName="Section title and description">
+<p:sldLayout xmlns:a="http://schemas.openxmlformats.org/drawingml/2006/main" xmlns:r="http://schemas.openxmlformats.org/officeDocument/2006/relationships" xmlns:p="http://schemas.openxmlformats.org/presentationml/2006/main" matchingName="Section title and description">
   <p:cSld name="SECTION_TITLE_AND_DESCRIPTION">
     <p:spTree>
       <p:nvGrpSpPr>
-        <p:cNvPr id="35" name="Shape 35"/>
+        <p:cNvPr id="1" name="Shape 35"/>
         <p:cNvGrpSpPr/>
         <p:nvPr/>
       </p:nvGrpSpPr>
@@ -3823,12 +3930,12 @@
           </a:ln>
         </p:spPr>
         <p:txBody>
-          <a:bodyPr anchorCtr="0" anchor="ctr" bIns="91425" lIns="91425" spcFirstLastPara="1" rIns="91425" wrap="square" tIns="91425">
+          <a:bodyPr spcFirstLastPara="1" wrap="square" lIns="91425" tIns="91425" rIns="91425" bIns="91425" anchor="ctr" anchorCtr="0">
             <a:noAutofit/>
           </a:bodyPr>
           <a:lstStyle/>
           <a:p>
-            <a:pPr indent="0" lvl="0" marL="0" rtl="0" algn="l">
+            <a:pPr marL="0" lvl="0" indent="0" algn="l" rtl="0">
               <a:spcBef>
                 <a:spcPts val="0"/>
               </a:spcBef>
@@ -3837,9 +3944,6 @@
               </a:spcAft>
               <a:buNone/>
             </a:pPr>
-            <a:r>
-              <a:t/>
-            </a:r>
             <a:endParaRPr/>
           </a:p>
         </p:txBody>
@@ -3847,7 +3951,9 @@
       <p:sp>
         <p:nvSpPr>
           <p:cNvPr id="37" name="Google Shape;37;p9"/>
-          <p:cNvSpPr txBox="1"/>
+          <p:cNvSpPr txBox="1">
+            <a:spLocks noGrp="1"/>
+          </p:cNvSpPr>
           <p:nvPr>
             <p:ph type="title"/>
           </p:nvPr>
@@ -3862,7 +3968,7 @@
           </a:prstGeom>
         </p:spPr>
         <p:txBody>
-          <a:bodyPr anchorCtr="0" anchor="b" bIns="91425" lIns="91425" spcFirstLastPara="1" rIns="91425" wrap="square" tIns="91425">
+          <a:bodyPr spcFirstLastPara="1" wrap="square" lIns="91425" tIns="91425" rIns="91425" bIns="91425" anchor="b" anchorCtr="0">
             <a:normAutofit/>
           </a:bodyPr>
           <a:lstStyle>
@@ -3966,15 +4072,19 @@
               <a:defRPr sz="4200"/>
             </a:lvl9pPr>
           </a:lstStyle>
-          <a:p/>
+          <a:p>
+            <a:endParaRPr/>
+          </a:p>
         </p:txBody>
       </p:sp>
       <p:sp>
         <p:nvSpPr>
           <p:cNvPr id="38" name="Google Shape;38;p9"/>
-          <p:cNvSpPr txBox="1"/>
+          <p:cNvSpPr txBox="1">
+            <a:spLocks noGrp="1"/>
+          </p:cNvSpPr>
           <p:nvPr>
-            <p:ph idx="1" type="subTitle"/>
+            <p:ph type="subTitle" idx="1"/>
           </p:nvPr>
         </p:nvSpPr>
         <p:spPr>
@@ -3987,7 +4097,7 @@
           </a:prstGeom>
         </p:spPr>
         <p:txBody>
-          <a:bodyPr anchorCtr="0" anchor="t" bIns="91425" lIns="91425" spcFirstLastPara="1" rIns="91425" wrap="square" tIns="91425">
+          <a:bodyPr spcFirstLastPara="1" wrap="square" lIns="91425" tIns="91425" rIns="91425" bIns="91425" anchor="t" anchorCtr="0">
             <a:normAutofit/>
           </a:bodyPr>
           <a:lstStyle>
@@ -4118,15 +4228,19 @@
               <a:defRPr sz="2100"/>
             </a:lvl9pPr>
           </a:lstStyle>
-          <a:p/>
+          <a:p>
+            <a:endParaRPr/>
+          </a:p>
         </p:txBody>
       </p:sp>
       <p:sp>
         <p:nvSpPr>
           <p:cNvPr id="39" name="Google Shape;39;p9"/>
-          <p:cNvSpPr txBox="1"/>
+          <p:cNvSpPr txBox="1">
+            <a:spLocks noGrp="1"/>
+          </p:cNvSpPr>
           <p:nvPr>
-            <p:ph idx="2" type="body"/>
+            <p:ph type="body" idx="2"/>
           </p:nvPr>
         </p:nvSpPr>
         <p:spPr>
@@ -4139,11 +4253,11 @@
           </a:prstGeom>
         </p:spPr>
         <p:txBody>
-          <a:bodyPr anchorCtr="0" anchor="ctr" bIns="91425" lIns="91425" spcFirstLastPara="1" rIns="91425" wrap="square" tIns="91425">
+          <a:bodyPr spcFirstLastPara="1" wrap="square" lIns="91425" tIns="91425" rIns="91425" bIns="91425" anchor="ctr" anchorCtr="0">
             <a:normAutofit/>
           </a:bodyPr>
           <a:lstStyle>
-            <a:lvl1pPr indent="-342900" lvl="0" marL="457200">
+            <a:lvl1pPr marL="457200" lvl="0" indent="-342900">
               <a:spcBef>
                 <a:spcPts val="0"/>
               </a:spcBef>
@@ -4154,7 +4268,7 @@
               <a:buChar char="●"/>
               <a:defRPr/>
             </a:lvl1pPr>
-            <a:lvl2pPr indent="-317500" lvl="1" marL="914400">
+            <a:lvl2pPr marL="914400" lvl="1" indent="-317500">
               <a:spcBef>
                 <a:spcPts val="0"/>
               </a:spcBef>
@@ -4165,7 +4279,7 @@
               <a:buChar char="○"/>
               <a:defRPr/>
             </a:lvl2pPr>
-            <a:lvl3pPr indent="-317500" lvl="2" marL="1371600">
+            <a:lvl3pPr marL="1371600" lvl="2" indent="-317500">
               <a:spcBef>
                 <a:spcPts val="0"/>
               </a:spcBef>
@@ -4176,7 +4290,7 @@
               <a:buChar char="■"/>
               <a:defRPr/>
             </a:lvl3pPr>
-            <a:lvl4pPr indent="-317500" lvl="3" marL="1828800">
+            <a:lvl4pPr marL="1828800" lvl="3" indent="-317500">
               <a:spcBef>
                 <a:spcPts val="0"/>
               </a:spcBef>
@@ -4187,7 +4301,7 @@
               <a:buChar char="●"/>
               <a:defRPr/>
             </a:lvl4pPr>
-            <a:lvl5pPr indent="-317500" lvl="4" marL="2286000">
+            <a:lvl5pPr marL="2286000" lvl="4" indent="-317500">
               <a:spcBef>
                 <a:spcPts val="0"/>
               </a:spcBef>
@@ -4198,7 +4312,7 @@
               <a:buChar char="○"/>
               <a:defRPr/>
             </a:lvl5pPr>
-            <a:lvl6pPr indent="-317500" lvl="5" marL="2743200">
+            <a:lvl6pPr marL="2743200" lvl="5" indent="-317500">
               <a:spcBef>
                 <a:spcPts val="0"/>
               </a:spcBef>
@@ -4209,7 +4323,7 @@
               <a:buChar char="■"/>
               <a:defRPr/>
             </a:lvl6pPr>
-            <a:lvl7pPr indent="-317500" lvl="6" marL="3200400">
+            <a:lvl7pPr marL="3200400" lvl="6" indent="-317500">
               <a:spcBef>
                 <a:spcPts val="0"/>
               </a:spcBef>
@@ -4220,7 +4334,7 @@
               <a:buChar char="●"/>
               <a:defRPr/>
             </a:lvl7pPr>
-            <a:lvl8pPr indent="-317500" lvl="7" marL="3657600">
+            <a:lvl8pPr marL="3657600" lvl="7" indent="-317500">
               <a:spcBef>
                 <a:spcPts val="0"/>
               </a:spcBef>
@@ -4231,7 +4345,7 @@
               <a:buChar char="○"/>
               <a:defRPr/>
             </a:lvl8pPr>
-            <a:lvl9pPr indent="-317500" lvl="8" marL="4114800">
+            <a:lvl9pPr marL="4114800" lvl="8" indent="-317500">
               <a:spcBef>
                 <a:spcPts val="0"/>
               </a:spcBef>
@@ -4243,15 +4357,19 @@
               <a:defRPr/>
             </a:lvl9pPr>
           </a:lstStyle>
-          <a:p/>
+          <a:p>
+            <a:endParaRPr/>
+          </a:p>
         </p:txBody>
       </p:sp>
       <p:sp>
         <p:nvSpPr>
           <p:cNvPr id="40" name="Google Shape;40;p9"/>
-          <p:cNvSpPr txBox="1"/>
+          <p:cNvSpPr txBox="1">
+            <a:spLocks noGrp="1"/>
+          </p:cNvSpPr>
           <p:nvPr>
-            <p:ph idx="12" type="sldNum"/>
+            <p:ph type="sldNum" idx="12"/>
           </p:nvPr>
         </p:nvSpPr>
         <p:spPr>
@@ -4264,7 +4382,7 @@
           </a:prstGeom>
         </p:spPr>
         <p:txBody>
-          <a:bodyPr anchorCtr="0" anchor="ctr" bIns="91425" lIns="91425" spcFirstLastPara="1" rIns="91425" wrap="square" tIns="91425">
+          <a:bodyPr spcFirstLastPara="1" wrap="square" lIns="91425" tIns="91425" rIns="91425" bIns="91425" anchor="ctr" anchorCtr="0">
             <a:normAutofit/>
           </a:bodyPr>
           <a:lstStyle>
@@ -4306,7 +4424,7 @@
             </a:lvl9pPr>
           </a:lstStyle>
           <a:p>
-            <a:pPr indent="0" lvl="0" marL="0" rtl="0" algn="r">
+            <a:pPr marL="0" lvl="0" indent="0" algn="r" rtl="0">
               <a:spcBef>
                 <a:spcPts val="0"/>
               </a:spcBef>
@@ -4332,11 +4450,11 @@
 </file>
 
 <file path=ppt/slideLayouts/slideLayout9.xml><?xml version="1.0" encoding="utf-8"?>
-<p:sldLayout xmlns:a="http://schemas.openxmlformats.org/drawingml/2006/main" xmlns:r="http://schemas.openxmlformats.org/officeDocument/2006/relationships" xmlns:mc="http://schemas.openxmlformats.org/markup-compatibility/2006" xmlns:mv="urn:schemas-microsoft-com:mac:vml" xmlns:p="http://schemas.openxmlformats.org/presentationml/2006/main" xmlns:c="http://schemas.openxmlformats.org/drawingml/2006/chart" xmlns:dgm="http://schemas.openxmlformats.org/drawingml/2006/diagram" xmlns:o="urn:schemas-microsoft-com:office:office" xmlns:v="urn:schemas-microsoft-com:vml" xmlns:pvml="urn:schemas-microsoft-com:office:powerpoint" xmlns:com="http://schemas.openxmlformats.org/drawingml/2006/compatibility" xmlns:p14="http://schemas.microsoft.com/office/powerpoint/2010/main" xmlns:p15="http://schemas.microsoft.com/office/powerpoint/2012/main" xmlns:ahyp="http://schemas.microsoft.com/office/drawing/2018/hyperlinkcolor" matchingName="Caption">
+<p:sldLayout xmlns:a="http://schemas.openxmlformats.org/drawingml/2006/main" xmlns:r="http://schemas.openxmlformats.org/officeDocument/2006/relationships" xmlns:p="http://schemas.openxmlformats.org/presentationml/2006/main" matchingName="Caption">
   <p:cSld name="CAPTION_ONLY">
     <p:spTree>
       <p:nvGrpSpPr>
-        <p:cNvPr id="41" name="Shape 41"/>
+        <p:cNvPr id="1" name="Shape 41"/>
         <p:cNvGrpSpPr/>
         <p:nvPr/>
       </p:nvGrpSpPr>
@@ -4351,9 +4469,11 @@
       <p:sp>
         <p:nvSpPr>
           <p:cNvPr id="42" name="Google Shape;42;p10"/>
-          <p:cNvSpPr txBox="1"/>
+          <p:cNvSpPr txBox="1">
+            <a:spLocks noGrp="1"/>
+          </p:cNvSpPr>
           <p:nvPr>
-            <p:ph idx="1" type="body"/>
+            <p:ph type="body" idx="1"/>
           </p:nvPr>
         </p:nvSpPr>
         <p:spPr>
@@ -4366,11 +4486,11 @@
           </a:prstGeom>
         </p:spPr>
         <p:txBody>
-          <a:bodyPr anchorCtr="0" anchor="ctr" bIns="91425" lIns="91425" spcFirstLastPara="1" rIns="91425" wrap="square" tIns="91425">
+          <a:bodyPr spcFirstLastPara="1" wrap="square" lIns="91425" tIns="91425" rIns="91425" bIns="91425" anchor="ctr" anchorCtr="0">
             <a:normAutofit/>
           </a:bodyPr>
           <a:lstStyle>
-            <a:lvl1pPr indent="-228600" lvl="0" marL="457200">
+            <a:lvl1pPr marL="457200" lvl="0" indent="-228600">
               <a:lnSpc>
                 <a:spcPct val="100000"/>
               </a:lnSpc>
@@ -4385,15 +4505,19 @@
               <a:defRPr/>
             </a:lvl1pPr>
           </a:lstStyle>
-          <a:p/>
+          <a:p>
+            <a:endParaRPr/>
+          </a:p>
         </p:txBody>
       </p:sp>
       <p:sp>
         <p:nvSpPr>
           <p:cNvPr id="43" name="Google Shape;43;p10"/>
-          <p:cNvSpPr txBox="1"/>
+          <p:cNvSpPr txBox="1">
+            <a:spLocks noGrp="1"/>
+          </p:cNvSpPr>
           <p:nvPr>
-            <p:ph idx="12" type="sldNum"/>
+            <p:ph type="sldNum" idx="12"/>
           </p:nvPr>
         </p:nvSpPr>
         <p:spPr>
@@ -4406,7 +4530,7 @@
           </a:prstGeom>
         </p:spPr>
         <p:txBody>
-          <a:bodyPr anchorCtr="0" anchor="ctr" bIns="91425" lIns="91425" spcFirstLastPara="1" rIns="91425" wrap="square" tIns="91425">
+          <a:bodyPr spcFirstLastPara="1" wrap="square" lIns="91425" tIns="91425" rIns="91425" bIns="91425" anchor="ctr" anchorCtr="0">
             <a:normAutofit/>
           </a:bodyPr>
           <a:lstStyle>
@@ -4448,7 +4572,7 @@
             </a:lvl9pPr>
           </a:lstStyle>
           <a:p>
-            <a:pPr indent="0" lvl="0" marL="0" rtl="0" algn="r">
+            <a:pPr marL="0" lvl="0" indent="0" algn="r" rtl="0">
               <a:spcBef>
                 <a:spcPts val="0"/>
               </a:spcBef>
@@ -4474,18 +4598,19 @@
 </file>
 
 <file path=ppt/slideMasters/slideMaster1.xml><?xml version="1.0" encoding="utf-8"?>
-<p:sldMaster xmlns:a="http://schemas.openxmlformats.org/drawingml/2006/main" xmlns:r="http://schemas.openxmlformats.org/officeDocument/2006/relationships" xmlns:mc="http://schemas.openxmlformats.org/markup-compatibility/2006" xmlns:mv="urn:schemas-microsoft-com:mac:vml" xmlns:p="http://schemas.openxmlformats.org/presentationml/2006/main" xmlns:c="http://schemas.openxmlformats.org/drawingml/2006/chart" xmlns:dgm="http://schemas.openxmlformats.org/drawingml/2006/diagram" xmlns:o="urn:schemas-microsoft-com:office:office" xmlns:v="urn:schemas-microsoft-com:vml" xmlns:pvml="urn:schemas-microsoft-com:office:powerpoint" xmlns:com="http://schemas.openxmlformats.org/drawingml/2006/compatibility" xmlns:p14="http://schemas.microsoft.com/office/powerpoint/2010/main" xmlns:p15="http://schemas.microsoft.com/office/powerpoint/2012/main" xmlns:ahyp="http://schemas.microsoft.com/office/drawing/2018/hyperlinkcolor">
+<p:sldMaster xmlns:a="http://schemas.openxmlformats.org/drawingml/2006/main" xmlns:r="http://schemas.openxmlformats.org/officeDocument/2006/relationships" xmlns:p="http://schemas.openxmlformats.org/presentationml/2006/main">
   <p:cSld name="simple-light-2">
     <p:bg>
       <p:bgPr>
         <a:solidFill>
           <a:schemeClr val="lt1"/>
         </a:solidFill>
+        <a:effectLst/>
       </p:bgPr>
     </p:bg>
     <p:spTree>
       <p:nvGrpSpPr>
-        <p:cNvPr id="5" name="Shape 5"/>
+        <p:cNvPr id="1" name="Shape 5"/>
         <p:cNvGrpSpPr/>
         <p:nvPr/>
       </p:nvGrpSpPr>
@@ -4500,7 +4625,9 @@
       <p:sp>
         <p:nvSpPr>
           <p:cNvPr id="6" name="Google Shape;6;p1"/>
-          <p:cNvSpPr txBox="1"/>
+          <p:cNvSpPr txBox="1">
+            <a:spLocks noGrp="1"/>
+          </p:cNvSpPr>
           <p:nvPr>
             <p:ph type="title"/>
           </p:nvPr>
@@ -4519,7 +4646,7 @@
           </a:ln>
         </p:spPr>
         <p:txBody>
-          <a:bodyPr anchorCtr="0" anchor="t" bIns="91425" lIns="91425" spcFirstLastPara="1" rIns="91425" wrap="square" tIns="91425">
+          <a:bodyPr spcFirstLastPara="1" wrap="square" lIns="91425" tIns="91425" rIns="91425" bIns="91425" anchor="t" anchorCtr="0">
             <a:normAutofit/>
           </a:bodyPr>
           <a:lstStyle>
@@ -4686,15 +4813,19 @@
               </a:defRPr>
             </a:lvl9pPr>
           </a:lstStyle>
-          <a:p/>
+          <a:p>
+            <a:endParaRPr/>
+          </a:p>
         </p:txBody>
       </p:sp>
       <p:sp>
         <p:nvSpPr>
           <p:cNvPr id="7" name="Google Shape;7;p1"/>
-          <p:cNvSpPr txBox="1"/>
+          <p:cNvSpPr txBox="1">
+            <a:spLocks noGrp="1"/>
+          </p:cNvSpPr>
           <p:nvPr>
-            <p:ph idx="1" type="body"/>
+            <p:ph type="body" idx="1"/>
           </p:nvPr>
         </p:nvSpPr>
         <p:spPr>
@@ -4711,11 +4842,11 @@
           </a:ln>
         </p:spPr>
         <p:txBody>
-          <a:bodyPr anchorCtr="0" anchor="t" bIns="91425" lIns="91425" spcFirstLastPara="1" rIns="91425" wrap="square" tIns="91425">
+          <a:bodyPr spcFirstLastPara="1" wrap="square" lIns="91425" tIns="91425" rIns="91425" bIns="91425" anchor="t" anchorCtr="0">
             <a:normAutofit/>
           </a:bodyPr>
           <a:lstStyle>
-            <a:lvl1pPr indent="-342900" lvl="0" marL="457200">
+            <a:lvl1pPr marL="457200" lvl="0" indent="-342900">
               <a:lnSpc>
                 <a:spcPct val="115000"/>
               </a:lnSpc>
@@ -4736,7 +4867,7 @@
                 </a:solidFill>
               </a:defRPr>
             </a:lvl1pPr>
-            <a:lvl2pPr indent="-317500" lvl="1" marL="914400">
+            <a:lvl2pPr marL="914400" lvl="1" indent="-317500">
               <a:lnSpc>
                 <a:spcPct val="115000"/>
               </a:lnSpc>
@@ -4757,7 +4888,7 @@
                 </a:solidFill>
               </a:defRPr>
             </a:lvl2pPr>
-            <a:lvl3pPr indent="-317500" lvl="2" marL="1371600">
+            <a:lvl3pPr marL="1371600" lvl="2" indent="-317500">
               <a:lnSpc>
                 <a:spcPct val="115000"/>
               </a:lnSpc>
@@ -4778,7 +4909,7 @@
                 </a:solidFill>
               </a:defRPr>
             </a:lvl3pPr>
-            <a:lvl4pPr indent="-317500" lvl="3" marL="1828800">
+            <a:lvl4pPr marL="1828800" lvl="3" indent="-317500">
               <a:lnSpc>
                 <a:spcPct val="115000"/>
               </a:lnSpc>
@@ -4799,7 +4930,7 @@
                 </a:solidFill>
               </a:defRPr>
             </a:lvl4pPr>
-            <a:lvl5pPr indent="-317500" lvl="4" marL="2286000">
+            <a:lvl5pPr marL="2286000" lvl="4" indent="-317500">
               <a:lnSpc>
                 <a:spcPct val="115000"/>
               </a:lnSpc>
@@ -4820,7 +4951,7 @@
                 </a:solidFill>
               </a:defRPr>
             </a:lvl5pPr>
-            <a:lvl6pPr indent="-317500" lvl="5" marL="2743200">
+            <a:lvl6pPr marL="2743200" lvl="5" indent="-317500">
               <a:lnSpc>
                 <a:spcPct val="115000"/>
               </a:lnSpc>
@@ -4841,7 +4972,7 @@
                 </a:solidFill>
               </a:defRPr>
             </a:lvl6pPr>
-            <a:lvl7pPr indent="-317500" lvl="6" marL="3200400">
+            <a:lvl7pPr marL="3200400" lvl="6" indent="-317500">
               <a:lnSpc>
                 <a:spcPct val="115000"/>
               </a:lnSpc>
@@ -4862,7 +4993,7 @@
                 </a:solidFill>
               </a:defRPr>
             </a:lvl7pPr>
-            <a:lvl8pPr indent="-317500" lvl="7" marL="3657600">
+            <a:lvl8pPr marL="3657600" lvl="7" indent="-317500">
               <a:lnSpc>
                 <a:spcPct val="115000"/>
               </a:lnSpc>
@@ -4883,7 +5014,7 @@
                 </a:solidFill>
               </a:defRPr>
             </a:lvl8pPr>
-            <a:lvl9pPr indent="-317500" lvl="8" marL="4114800">
+            <a:lvl9pPr marL="4114800" lvl="8" indent="-317500">
               <a:lnSpc>
                 <a:spcPct val="115000"/>
               </a:lnSpc>
@@ -4905,15 +5036,19 @@
               </a:defRPr>
             </a:lvl9pPr>
           </a:lstStyle>
-          <a:p/>
+          <a:p>
+            <a:endParaRPr/>
+          </a:p>
         </p:txBody>
       </p:sp>
       <p:sp>
         <p:nvSpPr>
           <p:cNvPr id="8" name="Google Shape;8;p1"/>
-          <p:cNvSpPr txBox="1"/>
+          <p:cNvSpPr txBox="1">
+            <a:spLocks noGrp="1"/>
+          </p:cNvSpPr>
           <p:nvPr>
-            <p:ph idx="12" type="sldNum"/>
+            <p:ph type="sldNum" idx="12"/>
           </p:nvPr>
         </p:nvSpPr>
         <p:spPr>
@@ -4930,7 +5065,7 @@
           </a:ln>
         </p:spPr>
         <p:txBody>
-          <a:bodyPr anchorCtr="0" anchor="ctr" bIns="91425" lIns="91425" spcFirstLastPara="1" rIns="91425" wrap="square" tIns="91425">
+          <a:bodyPr spcFirstLastPara="1" wrap="square" lIns="91425" tIns="91425" rIns="91425" bIns="91425" anchor="ctr" anchorCtr="0">
             <a:normAutofit/>
           </a:bodyPr>
           <a:lstStyle>
@@ -5008,7 +5143,7 @@
             </a:lvl9pPr>
           </a:lstStyle>
           <a:p>
-            <a:pPr indent="0" lvl="0" marL="0" rtl="0" algn="r">
+            <a:pPr marL="0" lvl="0" indent="0" algn="r" rtl="0">
               <a:spcBef>
                 <a:spcPts val="0"/>
               </a:spcBef>
@@ -5027,7 +5162,7 @@
       </p:sp>
     </p:spTree>
   </p:cSld>
-  <p:clrMap accent1="accent1" accent2="accent2" accent3="accent3" accent4="accent4" accent5="accent5" accent6="accent6" bg1="lt1" bg2="dk2" tx1="dk1" tx2="lt2" folHlink="folHlink" hlink="hlink"/>
+  <p:clrMap bg1="lt1" tx1="dk1" bg2="dk2" tx2="lt2" accent1="accent1" accent2="accent2" accent3="accent3" accent4="accent4" accent5="accent5" accent6="accent6" hlink="hlink" folHlink="folHlink"/>
   <p:sldLayoutIdLst>
     <p:sldLayoutId id="2147483648" r:id="rId1"/>
     <p:sldLayoutId id="2147483649" r:id="rId2"/>
@@ -5041,10 +5176,10 @@
     <p:sldLayoutId id="2147483657" r:id="rId10"/>
     <p:sldLayoutId id="2147483658" r:id="rId11"/>
   </p:sldLayoutIdLst>
-  <p:hf dt="0" ftr="0" hdr="0" sldNum="0"/>
+  <p:hf sldNum="0" hdr="0" ftr="0" dt="0"/>
   <p:txStyles>
     <p:titleStyle>
-      <a:defPPr lvl="0" marR="0" rtl="0" algn="l">
+      <a:defPPr marR="0" lvl="0" algn="l" rtl="0">
         <a:lnSpc>
           <a:spcPct val="100000"/>
         </a:lnSpc>
@@ -5055,7 +5190,7 @@
           <a:spcPts val="0"/>
         </a:spcAft>
       </a:defPPr>
-      <a:lvl1pPr lvl="0" marR="0" rtl="0" algn="l">
+      <a:lvl1pPr marR="0" lvl="0" algn="l" rtl="0">
         <a:lnSpc>
           <a:spcPct val="100000"/>
         </a:lnSpc>
@@ -5069,7 +5204,7 @@
           <a:srgbClr val="000000"/>
         </a:buClr>
         <a:buFont typeface="Arial"/>
-        <a:defRPr b="0" i="0" sz="1400" u="none" cap="none" strike="noStrike">
+        <a:defRPr sz="1400" b="0" i="0" u="none" strike="noStrike" cap="none">
           <a:solidFill>
             <a:srgbClr val="000000"/>
           </a:solidFill>
@@ -5079,7 +5214,7 @@
           <a:sym typeface="Arial"/>
         </a:defRPr>
       </a:lvl1pPr>
-      <a:lvl2pPr lvl="1" marR="0" rtl="0" algn="l">
+      <a:lvl2pPr marR="0" lvl="1" algn="l" rtl="0">
         <a:lnSpc>
           <a:spcPct val="100000"/>
         </a:lnSpc>
@@ -5093,7 +5228,7 @@
           <a:srgbClr val="000000"/>
         </a:buClr>
         <a:buFont typeface="Arial"/>
-        <a:defRPr b="0" i="0" sz="1400" u="none" cap="none" strike="noStrike">
+        <a:defRPr sz="1400" b="0" i="0" u="none" strike="noStrike" cap="none">
           <a:solidFill>
             <a:srgbClr val="000000"/>
           </a:solidFill>
@@ -5103,7 +5238,7 @@
           <a:sym typeface="Arial"/>
         </a:defRPr>
       </a:lvl2pPr>
-      <a:lvl3pPr lvl="2" marR="0" rtl="0" algn="l">
+      <a:lvl3pPr marR="0" lvl="2" algn="l" rtl="0">
         <a:lnSpc>
           <a:spcPct val="100000"/>
         </a:lnSpc>
@@ -5117,7 +5252,7 @@
           <a:srgbClr val="000000"/>
         </a:buClr>
         <a:buFont typeface="Arial"/>
-        <a:defRPr b="0" i="0" sz="1400" u="none" cap="none" strike="noStrike">
+        <a:defRPr sz="1400" b="0" i="0" u="none" strike="noStrike" cap="none">
           <a:solidFill>
             <a:srgbClr val="000000"/>
           </a:solidFill>
@@ -5127,7 +5262,7 @@
           <a:sym typeface="Arial"/>
         </a:defRPr>
       </a:lvl3pPr>
-      <a:lvl4pPr lvl="3" marR="0" rtl="0" algn="l">
+      <a:lvl4pPr marR="0" lvl="3" algn="l" rtl="0">
         <a:lnSpc>
           <a:spcPct val="100000"/>
         </a:lnSpc>
@@ -5141,7 +5276,7 @@
           <a:srgbClr val="000000"/>
         </a:buClr>
         <a:buFont typeface="Arial"/>
-        <a:defRPr b="0" i="0" sz="1400" u="none" cap="none" strike="noStrike">
+        <a:defRPr sz="1400" b="0" i="0" u="none" strike="noStrike" cap="none">
           <a:solidFill>
             <a:srgbClr val="000000"/>
           </a:solidFill>
@@ -5151,7 +5286,7 @@
           <a:sym typeface="Arial"/>
         </a:defRPr>
       </a:lvl4pPr>
-      <a:lvl5pPr lvl="4" marR="0" rtl="0" algn="l">
+      <a:lvl5pPr marR="0" lvl="4" algn="l" rtl="0">
         <a:lnSpc>
           <a:spcPct val="100000"/>
         </a:lnSpc>
@@ -5165,7 +5300,7 @@
           <a:srgbClr val="000000"/>
         </a:buClr>
         <a:buFont typeface="Arial"/>
-        <a:defRPr b="0" i="0" sz="1400" u="none" cap="none" strike="noStrike">
+        <a:defRPr sz="1400" b="0" i="0" u="none" strike="noStrike" cap="none">
           <a:solidFill>
             <a:srgbClr val="000000"/>
           </a:solidFill>
@@ -5175,7 +5310,7 @@
           <a:sym typeface="Arial"/>
         </a:defRPr>
       </a:lvl5pPr>
-      <a:lvl6pPr lvl="5" marR="0" rtl="0" algn="l">
+      <a:lvl6pPr marR="0" lvl="5" algn="l" rtl="0">
         <a:lnSpc>
           <a:spcPct val="100000"/>
         </a:lnSpc>
@@ -5189,7 +5324,7 @@
           <a:srgbClr val="000000"/>
         </a:buClr>
         <a:buFont typeface="Arial"/>
-        <a:defRPr b="0" i="0" sz="1400" u="none" cap="none" strike="noStrike">
+        <a:defRPr sz="1400" b="0" i="0" u="none" strike="noStrike" cap="none">
           <a:solidFill>
             <a:srgbClr val="000000"/>
           </a:solidFill>
@@ -5199,7 +5334,7 @@
           <a:sym typeface="Arial"/>
         </a:defRPr>
       </a:lvl6pPr>
-      <a:lvl7pPr lvl="6" marR="0" rtl="0" algn="l">
+      <a:lvl7pPr marR="0" lvl="6" algn="l" rtl="0">
         <a:lnSpc>
           <a:spcPct val="100000"/>
         </a:lnSpc>
@@ -5213,7 +5348,7 @@
           <a:srgbClr val="000000"/>
         </a:buClr>
         <a:buFont typeface="Arial"/>
-        <a:defRPr b="0" i="0" sz="1400" u="none" cap="none" strike="noStrike">
+        <a:defRPr sz="1400" b="0" i="0" u="none" strike="noStrike" cap="none">
           <a:solidFill>
             <a:srgbClr val="000000"/>
           </a:solidFill>
@@ -5223,7 +5358,7 @@
           <a:sym typeface="Arial"/>
         </a:defRPr>
       </a:lvl7pPr>
-      <a:lvl8pPr lvl="7" marR="0" rtl="0" algn="l">
+      <a:lvl8pPr marR="0" lvl="7" algn="l" rtl="0">
         <a:lnSpc>
           <a:spcPct val="100000"/>
         </a:lnSpc>
@@ -5237,7 +5372,7 @@
           <a:srgbClr val="000000"/>
         </a:buClr>
         <a:buFont typeface="Arial"/>
-        <a:defRPr b="0" i="0" sz="1400" u="none" cap="none" strike="noStrike">
+        <a:defRPr sz="1400" b="0" i="0" u="none" strike="noStrike" cap="none">
           <a:solidFill>
             <a:srgbClr val="000000"/>
           </a:solidFill>
@@ -5247,7 +5382,7 @@
           <a:sym typeface="Arial"/>
         </a:defRPr>
       </a:lvl8pPr>
-      <a:lvl9pPr lvl="8" marR="0" rtl="0" algn="l">
+      <a:lvl9pPr marR="0" lvl="8" algn="l" rtl="0">
         <a:lnSpc>
           <a:spcPct val="100000"/>
         </a:lnSpc>
@@ -5261,7 +5396,7 @@
           <a:srgbClr val="000000"/>
         </a:buClr>
         <a:buFont typeface="Arial"/>
-        <a:defRPr b="0" i="0" sz="1400" u="none" cap="none" strike="noStrike">
+        <a:defRPr sz="1400" b="0" i="0" u="none" strike="noStrike" cap="none">
           <a:solidFill>
             <a:srgbClr val="000000"/>
           </a:solidFill>
@@ -5273,7 +5408,7 @@
       </a:lvl9pPr>
     </p:titleStyle>
     <p:bodyStyle>
-      <a:defPPr lvl="0" marR="0" rtl="0" algn="l">
+      <a:defPPr marR="0" lvl="0" algn="l" rtl="0">
         <a:lnSpc>
           <a:spcPct val="100000"/>
         </a:lnSpc>
@@ -5284,7 +5419,7 @@
           <a:spcPts val="0"/>
         </a:spcAft>
       </a:defPPr>
-      <a:lvl1pPr lvl="0" marR="0" rtl="0" algn="l">
+      <a:lvl1pPr marR="0" lvl="0" algn="l" rtl="0">
         <a:lnSpc>
           <a:spcPct val="100000"/>
         </a:lnSpc>
@@ -5298,7 +5433,7 @@
           <a:srgbClr val="000000"/>
         </a:buClr>
         <a:buFont typeface="Arial"/>
-        <a:defRPr b="0" i="0" sz="1400" u="none" cap="none" strike="noStrike">
+        <a:defRPr sz="1400" b="0" i="0" u="none" strike="noStrike" cap="none">
           <a:solidFill>
             <a:srgbClr val="000000"/>
           </a:solidFill>
@@ -5308,7 +5443,7 @@
           <a:sym typeface="Arial"/>
         </a:defRPr>
       </a:lvl1pPr>
-      <a:lvl2pPr lvl="1" marR="0" rtl="0" algn="l">
+      <a:lvl2pPr marR="0" lvl="1" algn="l" rtl="0">
         <a:lnSpc>
           <a:spcPct val="100000"/>
         </a:lnSpc>
@@ -5322,7 +5457,7 @@
           <a:srgbClr val="000000"/>
         </a:buClr>
         <a:buFont typeface="Arial"/>
-        <a:defRPr b="0" i="0" sz="1400" u="none" cap="none" strike="noStrike">
+        <a:defRPr sz="1400" b="0" i="0" u="none" strike="noStrike" cap="none">
           <a:solidFill>
             <a:srgbClr val="000000"/>
           </a:solidFill>
@@ -5332,7 +5467,7 @@
           <a:sym typeface="Arial"/>
         </a:defRPr>
       </a:lvl2pPr>
-      <a:lvl3pPr lvl="2" marR="0" rtl="0" algn="l">
+      <a:lvl3pPr marR="0" lvl="2" algn="l" rtl="0">
         <a:lnSpc>
           <a:spcPct val="100000"/>
         </a:lnSpc>
@@ -5346,7 +5481,7 @@
           <a:srgbClr val="000000"/>
         </a:buClr>
         <a:buFont typeface="Arial"/>
-        <a:defRPr b="0" i="0" sz="1400" u="none" cap="none" strike="noStrike">
+        <a:defRPr sz="1400" b="0" i="0" u="none" strike="noStrike" cap="none">
           <a:solidFill>
             <a:srgbClr val="000000"/>
           </a:solidFill>
@@ -5356,7 +5491,7 @@
           <a:sym typeface="Arial"/>
         </a:defRPr>
       </a:lvl3pPr>
-      <a:lvl4pPr lvl="3" marR="0" rtl="0" algn="l">
+      <a:lvl4pPr marR="0" lvl="3" algn="l" rtl="0">
         <a:lnSpc>
           <a:spcPct val="100000"/>
         </a:lnSpc>
@@ -5370,7 +5505,7 @@
           <a:srgbClr val="000000"/>
         </a:buClr>
         <a:buFont typeface="Arial"/>
-        <a:defRPr b="0" i="0" sz="1400" u="none" cap="none" strike="noStrike">
+        <a:defRPr sz="1400" b="0" i="0" u="none" strike="noStrike" cap="none">
           <a:solidFill>
             <a:srgbClr val="000000"/>
           </a:solidFill>
@@ -5380,7 +5515,7 @@
           <a:sym typeface="Arial"/>
         </a:defRPr>
       </a:lvl4pPr>
-      <a:lvl5pPr lvl="4" marR="0" rtl="0" algn="l">
+      <a:lvl5pPr marR="0" lvl="4" algn="l" rtl="0">
         <a:lnSpc>
           <a:spcPct val="100000"/>
         </a:lnSpc>
@@ -5394,7 +5529,7 @@
           <a:srgbClr val="000000"/>
         </a:buClr>
         <a:buFont typeface="Arial"/>
-        <a:defRPr b="0" i="0" sz="1400" u="none" cap="none" strike="noStrike">
+        <a:defRPr sz="1400" b="0" i="0" u="none" strike="noStrike" cap="none">
           <a:solidFill>
             <a:srgbClr val="000000"/>
           </a:solidFill>
@@ -5404,7 +5539,7 @@
           <a:sym typeface="Arial"/>
         </a:defRPr>
       </a:lvl5pPr>
-      <a:lvl6pPr lvl="5" marR="0" rtl="0" algn="l">
+      <a:lvl6pPr marR="0" lvl="5" algn="l" rtl="0">
         <a:lnSpc>
           <a:spcPct val="100000"/>
         </a:lnSpc>
@@ -5418,7 +5553,7 @@
           <a:srgbClr val="000000"/>
         </a:buClr>
         <a:buFont typeface="Arial"/>
-        <a:defRPr b="0" i="0" sz="1400" u="none" cap="none" strike="noStrike">
+        <a:defRPr sz="1400" b="0" i="0" u="none" strike="noStrike" cap="none">
           <a:solidFill>
             <a:srgbClr val="000000"/>
           </a:solidFill>
@@ -5428,7 +5563,7 @@
           <a:sym typeface="Arial"/>
         </a:defRPr>
       </a:lvl6pPr>
-      <a:lvl7pPr lvl="6" marR="0" rtl="0" algn="l">
+      <a:lvl7pPr marR="0" lvl="6" algn="l" rtl="0">
         <a:lnSpc>
           <a:spcPct val="100000"/>
         </a:lnSpc>
@@ -5442,7 +5577,7 @@
           <a:srgbClr val="000000"/>
         </a:buClr>
         <a:buFont typeface="Arial"/>
-        <a:defRPr b="0" i="0" sz="1400" u="none" cap="none" strike="noStrike">
+        <a:defRPr sz="1400" b="0" i="0" u="none" strike="noStrike" cap="none">
           <a:solidFill>
             <a:srgbClr val="000000"/>
           </a:solidFill>
@@ -5452,7 +5587,7 @@
           <a:sym typeface="Arial"/>
         </a:defRPr>
       </a:lvl7pPr>
-      <a:lvl8pPr lvl="7" marR="0" rtl="0" algn="l">
+      <a:lvl8pPr marR="0" lvl="7" algn="l" rtl="0">
         <a:lnSpc>
           <a:spcPct val="100000"/>
         </a:lnSpc>
@@ -5466,7 +5601,7 @@
           <a:srgbClr val="000000"/>
         </a:buClr>
         <a:buFont typeface="Arial"/>
-        <a:defRPr b="0" i="0" sz="1400" u="none" cap="none" strike="noStrike">
+        <a:defRPr sz="1400" b="0" i="0" u="none" strike="noStrike" cap="none">
           <a:solidFill>
             <a:srgbClr val="000000"/>
           </a:solidFill>
@@ -5476,7 +5611,7 @@
           <a:sym typeface="Arial"/>
         </a:defRPr>
       </a:lvl8pPr>
-      <a:lvl9pPr lvl="8" marR="0" rtl="0" algn="l">
+      <a:lvl9pPr marR="0" lvl="8" algn="l" rtl="0">
         <a:lnSpc>
           <a:spcPct val="100000"/>
         </a:lnSpc>
@@ -5490,7 +5625,7 @@
           <a:srgbClr val="000000"/>
         </a:buClr>
         <a:buFont typeface="Arial"/>
-        <a:defRPr b="0" i="0" sz="1400" u="none" cap="none" strike="noStrike">
+        <a:defRPr sz="1400" b="0" i="0" u="none" strike="noStrike" cap="none">
           <a:solidFill>
             <a:srgbClr val="000000"/>
           </a:solidFill>
@@ -5502,7 +5637,7 @@
       </a:lvl9pPr>
     </p:bodyStyle>
     <p:otherStyle>
-      <a:defPPr lvl="0" marR="0" rtl="0" algn="l">
+      <a:defPPr marR="0" lvl="0" algn="l" rtl="0">
         <a:lnSpc>
           <a:spcPct val="100000"/>
         </a:lnSpc>
@@ -5513,7 +5648,7 @@
           <a:spcPts val="0"/>
         </a:spcAft>
       </a:defPPr>
-      <a:lvl1pPr lvl="0" marR="0" rtl="0" algn="l">
+      <a:lvl1pPr marR="0" lvl="0" algn="l" rtl="0">
         <a:lnSpc>
           <a:spcPct val="100000"/>
         </a:lnSpc>
@@ -5527,7 +5662,7 @@
           <a:srgbClr val="000000"/>
         </a:buClr>
         <a:buFont typeface="Arial"/>
-        <a:defRPr b="0" i="0" sz="1400" u="none" cap="none" strike="noStrike">
+        <a:defRPr sz="1400" b="0" i="0" u="none" strike="noStrike" cap="none">
           <a:solidFill>
             <a:srgbClr val="000000"/>
           </a:solidFill>
@@ -5537,7 +5672,7 @@
           <a:sym typeface="Arial"/>
         </a:defRPr>
       </a:lvl1pPr>
-      <a:lvl2pPr lvl="1" marR="0" rtl="0" algn="l">
+      <a:lvl2pPr marR="0" lvl="1" algn="l" rtl="0">
         <a:lnSpc>
           <a:spcPct val="100000"/>
         </a:lnSpc>
@@ -5551,7 +5686,7 @@
           <a:srgbClr val="000000"/>
         </a:buClr>
         <a:buFont typeface="Arial"/>
-        <a:defRPr b="0" i="0" sz="1400" u="none" cap="none" strike="noStrike">
+        <a:defRPr sz="1400" b="0" i="0" u="none" strike="noStrike" cap="none">
           <a:solidFill>
             <a:srgbClr val="000000"/>
           </a:solidFill>
@@ -5561,7 +5696,7 @@
           <a:sym typeface="Arial"/>
         </a:defRPr>
       </a:lvl2pPr>
-      <a:lvl3pPr lvl="2" marR="0" rtl="0" algn="l">
+      <a:lvl3pPr marR="0" lvl="2" algn="l" rtl="0">
         <a:lnSpc>
           <a:spcPct val="100000"/>
         </a:lnSpc>
@@ -5575,7 +5710,7 @@
           <a:srgbClr val="000000"/>
         </a:buClr>
         <a:buFont typeface="Arial"/>
-        <a:defRPr b="0" i="0" sz="1400" u="none" cap="none" strike="noStrike">
+        <a:defRPr sz="1400" b="0" i="0" u="none" strike="noStrike" cap="none">
           <a:solidFill>
             <a:srgbClr val="000000"/>
           </a:solidFill>
@@ -5585,7 +5720,7 @@
           <a:sym typeface="Arial"/>
         </a:defRPr>
       </a:lvl3pPr>
-      <a:lvl4pPr lvl="3" marR="0" rtl="0" algn="l">
+      <a:lvl4pPr marR="0" lvl="3" algn="l" rtl="0">
         <a:lnSpc>
           <a:spcPct val="100000"/>
         </a:lnSpc>
@@ -5599,7 +5734,7 @@
           <a:srgbClr val="000000"/>
         </a:buClr>
         <a:buFont typeface="Arial"/>
-        <a:defRPr b="0" i="0" sz="1400" u="none" cap="none" strike="noStrike">
+        <a:defRPr sz="1400" b="0" i="0" u="none" strike="noStrike" cap="none">
           <a:solidFill>
             <a:srgbClr val="000000"/>
           </a:solidFill>
@@ -5609,7 +5744,7 @@
           <a:sym typeface="Arial"/>
         </a:defRPr>
       </a:lvl4pPr>
-      <a:lvl5pPr lvl="4" marR="0" rtl="0" algn="l">
+      <a:lvl5pPr marR="0" lvl="4" algn="l" rtl="0">
         <a:lnSpc>
           <a:spcPct val="100000"/>
         </a:lnSpc>
@@ -5623,7 +5758,7 @@
           <a:srgbClr val="000000"/>
         </a:buClr>
         <a:buFont typeface="Arial"/>
-        <a:defRPr b="0" i="0" sz="1400" u="none" cap="none" strike="noStrike">
+        <a:defRPr sz="1400" b="0" i="0" u="none" strike="noStrike" cap="none">
           <a:solidFill>
             <a:srgbClr val="000000"/>
           </a:solidFill>
@@ -5633,7 +5768,7 @@
           <a:sym typeface="Arial"/>
         </a:defRPr>
       </a:lvl5pPr>
-      <a:lvl6pPr lvl="5" marR="0" rtl="0" algn="l">
+      <a:lvl6pPr marR="0" lvl="5" algn="l" rtl="0">
         <a:lnSpc>
           <a:spcPct val="100000"/>
         </a:lnSpc>
@@ -5647,7 +5782,7 @@
           <a:srgbClr val="000000"/>
         </a:buClr>
         <a:buFont typeface="Arial"/>
-        <a:defRPr b="0" i="0" sz="1400" u="none" cap="none" strike="noStrike">
+        <a:defRPr sz="1400" b="0" i="0" u="none" strike="noStrike" cap="none">
           <a:solidFill>
             <a:srgbClr val="000000"/>
           </a:solidFill>
@@ -5657,7 +5792,7 @@
           <a:sym typeface="Arial"/>
         </a:defRPr>
       </a:lvl6pPr>
-      <a:lvl7pPr lvl="6" marR="0" rtl="0" algn="l">
+      <a:lvl7pPr marR="0" lvl="6" algn="l" rtl="0">
         <a:lnSpc>
           <a:spcPct val="100000"/>
         </a:lnSpc>
@@ -5671,7 +5806,7 @@
           <a:srgbClr val="000000"/>
         </a:buClr>
         <a:buFont typeface="Arial"/>
-        <a:defRPr b="0" i="0" sz="1400" u="none" cap="none" strike="noStrike">
+        <a:defRPr sz="1400" b="0" i="0" u="none" strike="noStrike" cap="none">
           <a:solidFill>
             <a:srgbClr val="000000"/>
           </a:solidFill>
@@ -5681,7 +5816,7 @@
           <a:sym typeface="Arial"/>
         </a:defRPr>
       </a:lvl7pPr>
-      <a:lvl8pPr lvl="7" marR="0" rtl="0" algn="l">
+      <a:lvl8pPr marR="0" lvl="7" algn="l" rtl="0">
         <a:lnSpc>
           <a:spcPct val="100000"/>
         </a:lnSpc>
@@ -5695,7 +5830,7 @@
           <a:srgbClr val="000000"/>
         </a:buClr>
         <a:buFont typeface="Arial"/>
-        <a:defRPr b="0" i="0" sz="1400" u="none" cap="none" strike="noStrike">
+        <a:defRPr sz="1400" b="0" i="0" u="none" strike="noStrike" cap="none">
           <a:solidFill>
             <a:srgbClr val="000000"/>
           </a:solidFill>
@@ -5705,7 +5840,7 @@
           <a:sym typeface="Arial"/>
         </a:defRPr>
       </a:lvl8pPr>
-      <a:lvl9pPr lvl="8" marR="0" rtl="0" algn="l">
+      <a:lvl9pPr marR="0" lvl="8" algn="l" rtl="0">
         <a:lnSpc>
           <a:spcPct val="100000"/>
         </a:lnSpc>
@@ -5719,7 +5854,7 @@
           <a:srgbClr val="000000"/>
         </a:buClr>
         <a:buFont typeface="Arial"/>
-        <a:defRPr b="0" i="0" sz="1400" u="none" cap="none" strike="noStrike">
+        <a:defRPr sz="1400" b="0" i="0" u="none" strike="noStrike" cap="none">
           <a:solidFill>
             <a:srgbClr val="000000"/>
           </a:solidFill>
@@ -5735,11 +5870,11 @@
 </file>
 
 <file path=ppt/slides/slide1.xml><?xml version="1.0" encoding="utf-8"?>
-<p:sld xmlns:a="http://schemas.openxmlformats.org/drawingml/2006/main" xmlns:r="http://schemas.openxmlformats.org/officeDocument/2006/relationships" xmlns:mc="http://schemas.openxmlformats.org/markup-compatibility/2006" xmlns:mv="urn:schemas-microsoft-com:mac:vml" xmlns:p="http://schemas.openxmlformats.org/presentationml/2006/main" xmlns:c="http://schemas.openxmlformats.org/drawingml/2006/chart" xmlns:dgm="http://schemas.openxmlformats.org/drawingml/2006/diagram" xmlns:o="urn:schemas-microsoft-com:office:office" xmlns:v="urn:schemas-microsoft-com:vml" xmlns:pvml="urn:schemas-microsoft-com:office:powerpoint" xmlns:com="http://schemas.openxmlformats.org/drawingml/2006/compatibility" xmlns:p14="http://schemas.microsoft.com/office/powerpoint/2010/main" xmlns:p15="http://schemas.microsoft.com/office/powerpoint/2012/main" xmlns:ahyp="http://schemas.microsoft.com/office/drawing/2018/hyperlinkcolor">
+<p:sld xmlns:a="http://schemas.openxmlformats.org/drawingml/2006/main" xmlns:r="http://schemas.openxmlformats.org/officeDocument/2006/relationships" xmlns:p="http://schemas.openxmlformats.org/presentationml/2006/main">
   <p:cSld>
     <p:spTree>
       <p:nvGrpSpPr>
-        <p:cNvPr id="53" name="Shape 53"/>
+        <p:cNvPr id="1" name="Shape 53"/>
         <p:cNvGrpSpPr/>
         <p:nvPr/>
       </p:nvGrpSpPr>
@@ -5754,7 +5889,9 @@
       <p:sp>
         <p:nvSpPr>
           <p:cNvPr id="54" name="Google Shape;54;p13"/>
-          <p:cNvSpPr txBox="1"/>
+          <p:cNvSpPr txBox="1">
+            <a:spLocks noGrp="1"/>
+          </p:cNvSpPr>
           <p:nvPr>
             <p:ph type="ctrTitle"/>
           </p:nvPr>
@@ -5769,12 +5906,12 @@
           </a:prstGeom>
         </p:spPr>
         <p:txBody>
-          <a:bodyPr anchorCtr="0" anchor="b" bIns="91425" lIns="91425" spcFirstLastPara="1" rIns="91425" wrap="square" tIns="91425">
+          <a:bodyPr spcFirstLastPara="1" wrap="square" lIns="91425" tIns="91425" rIns="91425" bIns="91425" anchor="b" anchorCtr="0">
             <a:normAutofit/>
           </a:bodyPr>
           <a:lstStyle/>
           <a:p>
-            <a:pPr indent="0" lvl="0" marL="0" rtl="0" algn="ctr">
+            <a:pPr marL="0" lvl="0" indent="0" algn="ctr" rtl="0">
               <a:spcBef>
                 <a:spcPts val="0"/>
               </a:spcBef>
@@ -5784,8 +5921,12 @@
               <a:buNone/>
             </a:pPr>
             <a:r>
+              <a:rPr lang="en" dirty="0"/>
+              <a:t>Chess </a:t>
+            </a:r>
+            <a:r>
               <a:rPr lang="en"/>
-              <a:t>Chess Games Analysis</a:t>
+              <a:t>Games Analysis</a:t>
             </a:r>
             <a:endParaRPr/>
           </a:p>
@@ -5794,9 +5935,11 @@
       <p:sp>
         <p:nvSpPr>
           <p:cNvPr id="55" name="Google Shape;55;p13"/>
-          <p:cNvSpPr txBox="1"/>
+          <p:cNvSpPr txBox="1">
+            <a:spLocks noGrp="1"/>
+          </p:cNvSpPr>
           <p:nvPr>
-            <p:ph idx="1" type="subTitle"/>
+            <p:ph type="subTitle" idx="1"/>
           </p:nvPr>
         </p:nvSpPr>
         <p:spPr>
@@ -5809,12 +5952,12 @@
           </a:prstGeom>
         </p:spPr>
         <p:txBody>
-          <a:bodyPr anchorCtr="0" anchor="t" bIns="91425" lIns="91425" spcFirstLastPara="1" rIns="91425" wrap="square" tIns="91425">
+          <a:bodyPr spcFirstLastPara="1" wrap="square" lIns="91425" tIns="91425" rIns="91425" bIns="91425" anchor="t" anchorCtr="0">
             <a:normAutofit/>
           </a:bodyPr>
           <a:lstStyle/>
           <a:p>
-            <a:pPr indent="0" lvl="0" marL="0" rtl="0" algn="ctr">
+            <a:pPr marL="0" lvl="0" indent="0" algn="ctr" rtl="0">
               <a:spcBef>
                 <a:spcPts val="0"/>
               </a:spcBef>
@@ -5823,9 +5966,6 @@
               </a:spcAft>
               <a:buNone/>
             </a:pPr>
-            <a:r>
-              <a:t/>
-            </a:r>
             <a:endParaRPr/>
           </a:p>
         </p:txBody>
@@ -5839,11 +5979,11 @@
 </file>
 
 <file path=ppt/slides/slide2.xml><?xml version="1.0" encoding="utf-8"?>
-<p:sld xmlns:a="http://schemas.openxmlformats.org/drawingml/2006/main" xmlns:r="http://schemas.openxmlformats.org/officeDocument/2006/relationships" xmlns:mc="http://schemas.openxmlformats.org/markup-compatibility/2006" xmlns:mv="urn:schemas-microsoft-com:mac:vml" xmlns:p="http://schemas.openxmlformats.org/presentationml/2006/main" xmlns:c="http://schemas.openxmlformats.org/drawingml/2006/chart" xmlns:dgm="http://schemas.openxmlformats.org/drawingml/2006/diagram" xmlns:o="urn:schemas-microsoft-com:office:office" xmlns:v="urn:schemas-microsoft-com:vml" xmlns:pvml="urn:schemas-microsoft-com:office:powerpoint" xmlns:com="http://schemas.openxmlformats.org/drawingml/2006/compatibility" xmlns:p14="http://schemas.microsoft.com/office/powerpoint/2010/main" xmlns:p15="http://schemas.microsoft.com/office/powerpoint/2012/main" xmlns:ahyp="http://schemas.microsoft.com/office/drawing/2018/hyperlinkcolor">
+<p:sld xmlns:a="http://schemas.openxmlformats.org/drawingml/2006/main" xmlns:r="http://schemas.openxmlformats.org/officeDocument/2006/relationships" xmlns:p="http://schemas.openxmlformats.org/presentationml/2006/main">
   <p:cSld>
     <p:spTree>
       <p:nvGrpSpPr>
-        <p:cNvPr id="59" name="Shape 59"/>
+        <p:cNvPr id="1" name="Shape 59"/>
         <p:cNvGrpSpPr/>
         <p:nvPr/>
       </p:nvGrpSpPr>
@@ -5858,7 +5998,9 @@
       <p:sp>
         <p:nvSpPr>
           <p:cNvPr id="60" name="Google Shape;60;p14"/>
-          <p:cNvSpPr txBox="1"/>
+          <p:cNvSpPr txBox="1">
+            <a:spLocks noGrp="1"/>
+          </p:cNvSpPr>
           <p:nvPr>
             <p:ph type="title"/>
           </p:nvPr>
@@ -5873,12 +6015,12 @@
           </a:prstGeom>
         </p:spPr>
         <p:txBody>
-          <a:bodyPr anchorCtr="0" anchor="ctr" bIns="91425" lIns="91425" spcFirstLastPara="1" rIns="91425" wrap="square" tIns="91425">
+          <a:bodyPr spcFirstLastPara="1" wrap="square" lIns="91425" tIns="91425" rIns="91425" bIns="91425" anchor="ctr" anchorCtr="0">
             <a:normAutofit/>
           </a:bodyPr>
           <a:lstStyle/>
           <a:p>
-            <a:pPr indent="0" lvl="0" marL="0" rtl="0" algn="ctr">
+            <a:pPr marL="0" lvl="0" indent="0" algn="ctr" rtl="0">
               <a:spcBef>
                 <a:spcPts val="0"/>
               </a:spcBef>
@@ -5898,9 +6040,11 @@
       <p:sp>
         <p:nvSpPr>
           <p:cNvPr id="61" name="Google Shape;61;p14"/>
-          <p:cNvSpPr txBox="1"/>
+          <p:cNvSpPr txBox="1">
+            <a:spLocks noGrp="1"/>
+          </p:cNvSpPr>
           <p:nvPr>
-            <p:ph idx="1" type="body"/>
+            <p:ph type="body" idx="1"/>
           </p:nvPr>
         </p:nvSpPr>
         <p:spPr>
@@ -5913,12 +6057,12 @@
           </a:prstGeom>
         </p:spPr>
         <p:txBody>
-          <a:bodyPr anchorCtr="0" anchor="t" bIns="91425" lIns="91425" spcFirstLastPara="1" rIns="91425" wrap="square" tIns="91425">
+          <a:bodyPr spcFirstLastPara="1" wrap="square" lIns="91425" tIns="91425" rIns="91425" bIns="91425" anchor="t" anchorCtr="0">
             <a:normAutofit/>
           </a:bodyPr>
           <a:lstStyle/>
           <a:p>
-            <a:pPr indent="0" lvl="0" marL="0" rtl="0" algn="ctr">
+            <a:pPr marL="0" lvl="0" indent="0" algn="ctr" rtl="0">
               <a:spcBef>
                 <a:spcPts val="0"/>
               </a:spcBef>
@@ -5934,7 +6078,7 @@
             <a:endParaRPr sz="2000"/>
           </a:p>
           <a:p>
-            <a:pPr indent="0" lvl="0" marL="914400" rtl="0" algn="l">
+            <a:pPr marL="914400" lvl="0" indent="0" algn="l" rtl="0">
               <a:spcBef>
                 <a:spcPts val="1200"/>
               </a:spcBef>
@@ -5950,7 +6094,7 @@
             <a:endParaRPr sz="1374"/>
           </a:p>
           <a:p>
-            <a:pPr indent="0" lvl="0" marL="914400" rtl="0" algn="l">
+            <a:pPr marL="914400" lvl="0" indent="0" algn="l" rtl="0">
               <a:spcBef>
                 <a:spcPts val="1200"/>
               </a:spcBef>
@@ -5961,23 +6105,7 @@
             </a:pPr>
             <a:r>
               <a:rPr lang="en" sz="1374"/>
-              <a:t>We will use tableau to determine if data analytics can </a:t>
-            </a:r>
-            <a:r>
-              <a:rPr lang="en" sz="1374"/>
-              <a:t>make</a:t>
-            </a:r>
-            <a:r>
-              <a:rPr lang="en" sz="1374"/>
-              <a:t> you a </a:t>
-            </a:r>
-            <a:r>
-              <a:rPr lang="en" sz="1374"/>
-              <a:t>better</a:t>
-            </a:r>
-            <a:r>
-              <a:rPr lang="en" sz="1374"/>
-              <a:t> chess player</a:t>
+              <a:t>We will use tableau to determine if data analytics can make you a better chess player</a:t>
             </a:r>
             <a:endParaRPr sz="1374"/>
           </a:p>
@@ -5992,11 +6120,11 @@
 </file>
 
 <file path=ppt/slides/slide3.xml><?xml version="1.0" encoding="utf-8"?>
-<p:sld xmlns:a="http://schemas.openxmlformats.org/drawingml/2006/main" xmlns:r="http://schemas.openxmlformats.org/officeDocument/2006/relationships" xmlns:mc="http://schemas.openxmlformats.org/markup-compatibility/2006" xmlns:mv="urn:schemas-microsoft-com:mac:vml" xmlns:p="http://schemas.openxmlformats.org/presentationml/2006/main" xmlns:c="http://schemas.openxmlformats.org/drawingml/2006/chart" xmlns:dgm="http://schemas.openxmlformats.org/drawingml/2006/diagram" xmlns:o="urn:schemas-microsoft-com:office:office" xmlns:v="urn:schemas-microsoft-com:vml" xmlns:pvml="urn:schemas-microsoft-com:office:powerpoint" xmlns:com="http://schemas.openxmlformats.org/drawingml/2006/compatibility" xmlns:p14="http://schemas.microsoft.com/office/powerpoint/2010/main" xmlns:p15="http://schemas.microsoft.com/office/powerpoint/2012/main" xmlns:ahyp="http://schemas.microsoft.com/office/drawing/2018/hyperlinkcolor">
+<p:sld xmlns:a="http://schemas.openxmlformats.org/drawingml/2006/main" xmlns:r="http://schemas.openxmlformats.org/officeDocument/2006/relationships" xmlns:p="http://schemas.openxmlformats.org/presentationml/2006/main">
   <p:cSld>
     <p:spTree>
       <p:nvGrpSpPr>
-        <p:cNvPr id="65" name="Shape 65"/>
+        <p:cNvPr id="1" name="Shape 65"/>
         <p:cNvGrpSpPr/>
         <p:nvPr/>
       </p:nvGrpSpPr>
@@ -6011,7 +6139,9 @@
       <p:sp>
         <p:nvSpPr>
           <p:cNvPr id="66" name="Google Shape;66;p15"/>
-          <p:cNvSpPr txBox="1"/>
+          <p:cNvSpPr txBox="1">
+            <a:spLocks noGrp="1"/>
+          </p:cNvSpPr>
           <p:nvPr>
             <p:ph type="title"/>
           </p:nvPr>
@@ -6026,12 +6156,12 @@
           </a:prstGeom>
         </p:spPr>
         <p:txBody>
-          <a:bodyPr anchorCtr="0" anchor="t" bIns="91425" lIns="91425" spcFirstLastPara="1" rIns="91425" wrap="square" tIns="91425">
+          <a:bodyPr spcFirstLastPara="1" wrap="square" lIns="91425" tIns="91425" rIns="91425" bIns="91425" anchor="t" anchorCtr="0">
             <a:normAutofit fontScale="90000"/>
           </a:bodyPr>
           <a:lstStyle/>
           <a:p>
-            <a:pPr indent="0" lvl="0" marL="0" rtl="0" algn="ctr">
+            <a:pPr marL="0" lvl="0" indent="0" algn="ctr" rtl="0">
               <a:spcBef>
                 <a:spcPts val="0"/>
               </a:spcBef>
@@ -6051,9 +6181,11 @@
       <p:sp>
         <p:nvSpPr>
           <p:cNvPr id="67" name="Google Shape;67;p15"/>
-          <p:cNvSpPr txBox="1"/>
+          <p:cNvSpPr txBox="1">
+            <a:spLocks noGrp="1"/>
+          </p:cNvSpPr>
           <p:nvPr>
-            <p:ph idx="1" type="body"/>
+            <p:ph type="body" idx="1"/>
           </p:nvPr>
         </p:nvSpPr>
         <p:spPr>
@@ -6066,12 +6198,12 @@
           </a:prstGeom>
         </p:spPr>
         <p:txBody>
-          <a:bodyPr anchorCtr="0" anchor="t" bIns="91425" lIns="91425" spcFirstLastPara="1" rIns="91425" wrap="square" tIns="91425">
+          <a:bodyPr spcFirstLastPara="1" wrap="square" lIns="91425" tIns="91425" rIns="91425" bIns="91425" anchor="t" anchorCtr="0">
             <a:normAutofit/>
           </a:bodyPr>
           <a:lstStyle/>
           <a:p>
-            <a:pPr indent="-342900" lvl="0" marL="457200" rtl="0" algn="l">
+            <a:pPr marL="457200" lvl="0" indent="-342900" algn="l" rtl="0">
               <a:spcBef>
                 <a:spcPts val="0"/>
               </a:spcBef>
@@ -6088,7 +6220,7 @@
             <a:endParaRPr/>
           </a:p>
           <a:p>
-            <a:pPr indent="-317500" lvl="1" marL="914400" rtl="0" algn="l">
+            <a:pPr marL="914400" lvl="1" indent="-317500" algn="l" rtl="0">
               <a:spcBef>
                 <a:spcPts val="0"/>
               </a:spcBef>
@@ -6105,7 +6237,7 @@
             <a:endParaRPr/>
           </a:p>
           <a:p>
-            <a:pPr indent="-317500" lvl="1" marL="914400" rtl="0" algn="l">
+            <a:pPr marL="914400" lvl="1" indent="-317500" algn="l" rtl="0">
               <a:spcBef>
                 <a:spcPts val="0"/>
               </a:spcBef>
@@ -6122,7 +6254,7 @@
             <a:endParaRPr/>
           </a:p>
           <a:p>
-            <a:pPr indent="-317500" lvl="1" marL="914400" rtl="0" algn="l">
+            <a:pPr marL="914400" lvl="1" indent="-317500" algn="l" rtl="0">
               <a:spcBef>
                 <a:spcPts val="0"/>
               </a:spcBef>
@@ -6139,7 +6271,7 @@
             <a:endParaRPr/>
           </a:p>
           <a:p>
-            <a:pPr indent="-317500" lvl="1" marL="914400" rtl="0" algn="l">
+            <a:pPr marL="914400" lvl="1" indent="-317500" algn="l" rtl="0">
               <a:spcBef>
                 <a:spcPts val="0"/>
               </a:spcBef>
@@ -6156,7 +6288,7 @@
             <a:endParaRPr/>
           </a:p>
           <a:p>
-            <a:pPr indent="-317500" lvl="1" marL="914400" rtl="0" algn="l">
+            <a:pPr marL="914400" lvl="1" indent="-317500" algn="l" rtl="0">
               <a:spcBef>
                 <a:spcPts val="0"/>
               </a:spcBef>
@@ -6183,11 +6315,11 @@
 </file>
 
 <file path=ppt/slides/slide4.xml><?xml version="1.0" encoding="utf-8"?>
-<p:sld xmlns:a="http://schemas.openxmlformats.org/drawingml/2006/main" xmlns:r="http://schemas.openxmlformats.org/officeDocument/2006/relationships" xmlns:mc="http://schemas.openxmlformats.org/markup-compatibility/2006" xmlns:mv="urn:schemas-microsoft-com:mac:vml" xmlns:p="http://schemas.openxmlformats.org/presentationml/2006/main" xmlns:c="http://schemas.openxmlformats.org/drawingml/2006/chart" xmlns:dgm="http://schemas.openxmlformats.org/drawingml/2006/diagram" xmlns:o="urn:schemas-microsoft-com:office:office" xmlns:v="urn:schemas-microsoft-com:vml" xmlns:pvml="urn:schemas-microsoft-com:office:powerpoint" xmlns:com="http://schemas.openxmlformats.org/drawingml/2006/compatibility" xmlns:p14="http://schemas.microsoft.com/office/powerpoint/2010/main" xmlns:p15="http://schemas.microsoft.com/office/powerpoint/2012/main" xmlns:ahyp="http://schemas.microsoft.com/office/drawing/2018/hyperlinkcolor">
+<p:sld xmlns:a="http://schemas.openxmlformats.org/drawingml/2006/main" xmlns:r="http://schemas.openxmlformats.org/officeDocument/2006/relationships" xmlns:p="http://schemas.openxmlformats.org/presentationml/2006/main">
   <p:cSld>
     <p:spTree>
       <p:nvGrpSpPr>
-        <p:cNvPr id="71" name="Shape 71"/>
+        <p:cNvPr id="1" name="Shape 71"/>
         <p:cNvGrpSpPr/>
         <p:nvPr/>
       </p:nvGrpSpPr>
@@ -6202,7 +6334,9 @@
       <p:sp>
         <p:nvSpPr>
           <p:cNvPr id="72" name="Google Shape;72;p16"/>
-          <p:cNvSpPr txBox="1"/>
+          <p:cNvSpPr txBox="1">
+            <a:spLocks noGrp="1"/>
+          </p:cNvSpPr>
           <p:nvPr>
             <p:ph type="title"/>
           </p:nvPr>
@@ -6217,12 +6351,12 @@
           </a:prstGeom>
         </p:spPr>
         <p:txBody>
-          <a:bodyPr anchorCtr="0" anchor="t" bIns="91425" lIns="91425" spcFirstLastPara="1" rIns="91425" wrap="square" tIns="91425">
+          <a:bodyPr spcFirstLastPara="1" wrap="square" lIns="91425" tIns="91425" rIns="91425" bIns="91425" anchor="t" anchorCtr="0">
             <a:normAutofit fontScale="90000"/>
           </a:bodyPr>
           <a:lstStyle/>
           <a:p>
-            <a:pPr indent="0" lvl="0" marL="0" rtl="0" algn="ctr">
+            <a:pPr marL="0" lvl="0" indent="0" algn="ctr" rtl="0">
               <a:spcBef>
                 <a:spcPts val="0"/>
               </a:spcBef>
@@ -6242,9 +6376,11 @@
       <p:sp>
         <p:nvSpPr>
           <p:cNvPr id="73" name="Google Shape;73;p16"/>
-          <p:cNvSpPr txBox="1"/>
+          <p:cNvSpPr txBox="1">
+            <a:spLocks noGrp="1"/>
+          </p:cNvSpPr>
           <p:nvPr>
-            <p:ph idx="1" type="body"/>
+            <p:ph type="body" idx="1"/>
           </p:nvPr>
         </p:nvSpPr>
         <p:spPr>
@@ -6257,12 +6393,12 @@
           </a:prstGeom>
         </p:spPr>
         <p:txBody>
-          <a:bodyPr anchorCtr="0" anchor="t" bIns="91425" lIns="91425" spcFirstLastPara="1" rIns="91425" wrap="square" tIns="91425">
+          <a:bodyPr spcFirstLastPara="1" wrap="square" lIns="91425" tIns="91425" rIns="91425" bIns="91425" anchor="t" anchorCtr="0">
             <a:normAutofit/>
           </a:bodyPr>
           <a:lstStyle/>
           <a:p>
-            <a:pPr indent="0" lvl="0" marL="0" rtl="0" algn="l">
+            <a:pPr marL="0" lvl="0" indent="0" algn="l" rtl="0">
               <a:spcBef>
                 <a:spcPts val="0"/>
               </a:spcBef>
@@ -6278,7 +6414,7 @@
             <a:endParaRPr/>
           </a:p>
           <a:p>
-            <a:pPr indent="-342900" lvl="0" marL="457200" rtl="0" algn="l">
+            <a:pPr marL="457200" lvl="0" indent="-342900" algn="l" rtl="0">
               <a:spcBef>
                 <a:spcPts val="1200"/>
               </a:spcBef>
@@ -6295,7 +6431,7 @@
             <a:endParaRPr/>
           </a:p>
           <a:p>
-            <a:pPr indent="0" lvl="0" marL="0" rtl="0" algn="l">
+            <a:pPr marL="0" lvl="0" indent="0" algn="l" rtl="0">
               <a:spcBef>
                 <a:spcPts val="1200"/>
               </a:spcBef>
@@ -6311,7 +6447,7 @@
             <a:endParaRPr/>
           </a:p>
           <a:p>
-            <a:pPr indent="-342900" lvl="0" marL="457200" rtl="0" algn="l">
+            <a:pPr marL="457200" lvl="0" indent="-342900" algn="l" rtl="0">
               <a:spcBef>
                 <a:spcPts val="1200"/>
               </a:spcBef>
@@ -6338,7 +6474,7 @@
 </file>
 
 <file path=ppt/theme/theme1.xml><?xml version="1.0" encoding="utf-8"?>
-<a:theme xmlns:a="http://schemas.openxmlformats.org/drawingml/2006/main" xmlns:r="http://schemas.openxmlformats.org/officeDocument/2006/relationships" name="Simple Light">
+<a:theme xmlns:a="http://schemas.openxmlformats.org/drawingml/2006/main" name="Simple Light">
   <a:themeElements>
     <a:clrScheme name="Simple Light">
       <a:dk1>
@@ -6613,11 +6749,13 @@
       </a:bgFillStyleLst>
     </a:fmtScheme>
   </a:themeElements>
+  <a:objectDefaults/>
+  <a:extraClrSchemeLst/>
 </a:theme>
 </file>
 
 <file path=ppt/theme/theme2.xml><?xml version="1.0" encoding="utf-8"?>
-<a:theme xmlns:a="http://schemas.openxmlformats.org/drawingml/2006/main" xmlns:r="http://schemas.openxmlformats.org/officeDocument/2006/relationships">
+<a:theme xmlns:a="http://schemas.openxmlformats.org/drawingml/2006/main">
   <a:themeElements>
     <a:clrScheme name="Default">
       <a:dk1>
@@ -6892,5 +7030,7 @@
       </a:bgFillStyleLst>
     </a:fmtScheme>
   </a:themeElements>
+  <a:objectDefaults/>
+  <a:extraClrSchemeLst/>
 </a:theme>
 </file>
</xml_diff>